<commit_message>
[+] Mensie upravy a vygenerovanie do PDF
</commit_message>
<xml_diff>
--- a/Dokumentacie/Ostatne/Poster/poster2.pptx
+++ b/Dokumentacie/Ostatne/Poster/poster2.pptx
@@ -289,7 +289,7 @@
             <a:fld id="{1D8D854A-19DA-40F4-B9B0-2B2EB915EC68}" type="datetimeFigureOut">
               <a:rPr lang="sk-SK" smtClean="0"/>
               <a:pPr/>
-              <a:t>22. 4. 2012</a:t>
+              <a:t>23. 4. 2012</a:t>
             </a:fld>
             <a:endParaRPr lang="sk-SK"/>
           </a:p>
@@ -456,7 +456,7 @@
             <a:fld id="{1D8D854A-19DA-40F4-B9B0-2B2EB915EC68}" type="datetimeFigureOut">
               <a:rPr lang="sk-SK" smtClean="0"/>
               <a:pPr/>
-              <a:t>22. 4. 2012</a:t>
+              <a:t>23. 4. 2012</a:t>
             </a:fld>
             <a:endParaRPr lang="sk-SK"/>
           </a:p>
@@ -633,7 +633,7 @@
             <a:fld id="{1D8D854A-19DA-40F4-B9B0-2B2EB915EC68}" type="datetimeFigureOut">
               <a:rPr lang="sk-SK" smtClean="0"/>
               <a:pPr/>
-              <a:t>22. 4. 2012</a:t>
+              <a:t>23. 4. 2012</a:t>
             </a:fld>
             <a:endParaRPr lang="sk-SK"/>
           </a:p>
@@ -800,7 +800,7 @@
             <a:fld id="{1D8D854A-19DA-40F4-B9B0-2B2EB915EC68}" type="datetimeFigureOut">
               <a:rPr lang="sk-SK" smtClean="0"/>
               <a:pPr/>
-              <a:t>22. 4. 2012</a:t>
+              <a:t>23. 4. 2012</a:t>
             </a:fld>
             <a:endParaRPr lang="sk-SK"/>
           </a:p>
@@ -1043,7 +1043,7 @@
             <a:fld id="{1D8D854A-19DA-40F4-B9B0-2B2EB915EC68}" type="datetimeFigureOut">
               <a:rPr lang="sk-SK" smtClean="0"/>
               <a:pPr/>
-              <a:t>22. 4. 2012</a:t>
+              <a:t>23. 4. 2012</a:t>
             </a:fld>
             <a:endParaRPr lang="sk-SK"/>
           </a:p>
@@ -1328,7 +1328,7 @@
             <a:fld id="{1D8D854A-19DA-40F4-B9B0-2B2EB915EC68}" type="datetimeFigureOut">
               <a:rPr lang="sk-SK" smtClean="0"/>
               <a:pPr/>
-              <a:t>22. 4. 2012</a:t>
+              <a:t>23. 4. 2012</a:t>
             </a:fld>
             <a:endParaRPr lang="sk-SK"/>
           </a:p>
@@ -1752,7 +1752,7 @@
             <a:fld id="{1D8D854A-19DA-40F4-B9B0-2B2EB915EC68}" type="datetimeFigureOut">
               <a:rPr lang="sk-SK" smtClean="0"/>
               <a:pPr/>
-              <a:t>22. 4. 2012</a:t>
+              <a:t>23. 4. 2012</a:t>
             </a:fld>
             <a:endParaRPr lang="sk-SK"/>
           </a:p>
@@ -1867,7 +1867,7 @@
             <a:fld id="{1D8D854A-19DA-40F4-B9B0-2B2EB915EC68}" type="datetimeFigureOut">
               <a:rPr lang="sk-SK" smtClean="0"/>
               <a:pPr/>
-              <a:t>22. 4. 2012</a:t>
+              <a:t>23. 4. 2012</a:t>
             </a:fld>
             <a:endParaRPr lang="sk-SK"/>
           </a:p>
@@ -1959,7 +1959,7 @@
             <a:fld id="{1D8D854A-19DA-40F4-B9B0-2B2EB915EC68}" type="datetimeFigureOut">
               <a:rPr lang="sk-SK" smtClean="0"/>
               <a:pPr/>
-              <a:t>22. 4. 2012</a:t>
+              <a:t>23. 4. 2012</a:t>
             </a:fld>
             <a:endParaRPr lang="sk-SK"/>
           </a:p>
@@ -2233,7 +2233,7 @@
             <a:fld id="{1D8D854A-19DA-40F4-B9B0-2B2EB915EC68}" type="datetimeFigureOut">
               <a:rPr lang="sk-SK" smtClean="0"/>
               <a:pPr/>
-              <a:t>22. 4. 2012</a:t>
+              <a:t>23. 4. 2012</a:t>
             </a:fld>
             <a:endParaRPr lang="sk-SK"/>
           </a:p>
@@ -2483,7 +2483,7 @@
             <a:fld id="{1D8D854A-19DA-40F4-B9B0-2B2EB915EC68}" type="datetimeFigureOut">
               <a:rPr lang="sk-SK" smtClean="0"/>
               <a:pPr/>
-              <a:t>22. 4. 2012</a:t>
+              <a:t>23. 4. 2012</a:t>
             </a:fld>
             <a:endParaRPr lang="sk-SK"/>
           </a:p>
@@ -2693,7 +2693,7 @@
             <a:fld id="{1D8D854A-19DA-40F4-B9B0-2B2EB915EC68}" type="datetimeFigureOut">
               <a:rPr lang="sk-SK" smtClean="0"/>
               <a:pPr/>
-              <a:t>22. 4. 2012</a:t>
+              <a:t>23. 4. 2012</a:t>
             </a:fld>
             <a:endParaRPr lang="sk-SK"/>
           </a:p>
@@ -3636,23 +3636,7 @@
                   <a:schemeClr val="bg1"/>
                 </a:solidFill>
               </a:rPr>
-              <a:t>http</a:t>
-            </a:r>
-            <a:r>
-              <a:rPr lang="fr-FR" sz="2800" smtClean="0">
-                <a:solidFill>
-                  <a:schemeClr val="bg1"/>
-                </a:solidFill>
-              </a:rPr>
-              <a:t>://</a:t>
-            </a:r>
-            <a:r>
-              <a:rPr lang="fr-FR" sz="2800" smtClean="0">
-                <a:solidFill>
-                  <a:schemeClr val="bg1"/>
-                </a:solidFill>
-              </a:rPr>
-              <a:t>innovators-team10.github.com</a:t>
+              <a:t>http://innovators-team10.github.com</a:t>
             </a:r>
           </a:p>
           <a:p>
@@ -4363,14 +4347,7 @@
                 <a:latin typeface="+mj-lt"/>
                 <a:cs typeface="Arial" pitchFamily="34" charset="0"/>
               </a:rPr>
-              <a:t>How </a:t>
-            </a:r>
-            <a:r>
-              <a:rPr lang="en-US" sz="5400" b="1" smtClean="0">
-                <a:latin typeface="+mj-lt"/>
-                <a:cs typeface="Arial" pitchFamily="34" charset="0"/>
-              </a:rPr>
-              <a:t>classical text</a:t>
+              <a:t>How classical text</a:t>
             </a:r>
             <a:r>
               <a:rPr lang="sk-SK" sz="5400" b="1" smtClean="0">
@@ -4679,20 +4656,7 @@
                 <a:latin typeface="Buxton Sketch" pitchFamily="66" charset="0"/>
                 <a:cs typeface="Aharoni" pitchFamily="2" charset="-79"/>
               </a:rPr>
-              <a:t> </a:t>
-            </a:r>
-            <a:r>
-              <a:rPr lang="sk-SK" sz="3600" smtClean="0">
-                <a:solidFill>
-                  <a:schemeClr val="tx1">
-                    <a:lumMod val="75000"/>
-                    <a:lumOff val="25000"/>
-                  </a:schemeClr>
-                </a:solidFill>
-                <a:latin typeface="Buxton Sketch" pitchFamily="66" charset="0"/>
-                <a:cs typeface="Aharoni" pitchFamily="2" charset="-79"/>
-              </a:rPr>
-              <a:t>a</a:t>
+              <a:t> a</a:t>
             </a:r>
             <a:r>
               <a:rPr lang="en-US" sz="3600" smtClean="0">
@@ -4828,10 +4792,10 @@
                 <a:latin typeface="Buxton Sketch" pitchFamily="66" charset="0"/>
                 <a:cs typeface="Aharoni" pitchFamily="2" charset="-79"/>
               </a:rPr>
-              <a:t> </a:t>
-            </a:r>
-            <a:r>
-              <a:rPr lang="sk-SK" sz="3600" smtClean="0">
+              <a:t> visualizazion as</a:t>
+            </a:r>
+            <a:r>
+              <a:rPr lang="en-US" sz="3600" smtClean="0">
                 <a:solidFill>
                   <a:schemeClr val="tx1">
                     <a:lumMod val="75000"/>
@@ -4841,10 +4805,10 @@
                 <a:latin typeface="Buxton Sketch" pitchFamily="66" charset="0"/>
                 <a:cs typeface="Aharoni" pitchFamily="2" charset="-79"/>
               </a:rPr>
-              <a:t>visualizazion as</a:t>
-            </a:r>
-            <a:r>
-              <a:rPr lang="en-US" sz="3600" smtClean="0">
+              <a:t> a</a:t>
+            </a:r>
+            <a:r>
+              <a:rPr lang="sk-SK" sz="3600" smtClean="0">
                 <a:solidFill>
                   <a:schemeClr val="tx1">
                     <a:lumMod val="75000"/>
@@ -4854,10 +4818,10 @@
                 <a:latin typeface="Buxton Sketch" pitchFamily="66" charset="0"/>
                 <a:cs typeface="Aharoni" pitchFamily="2" charset="-79"/>
               </a:rPr>
-              <a:t> a</a:t>
-            </a:r>
-            <a:r>
-              <a:rPr lang="sk-SK" sz="3600" smtClean="0">
+              <a:t> structure</a:t>
+            </a:r>
+            <a:r>
+              <a:rPr lang="en-US" sz="3600" smtClean="0">
                 <a:solidFill>
                   <a:schemeClr val="tx1">
                     <a:lumMod val="75000"/>
@@ -4867,46 +4831,7 @@
                 <a:latin typeface="Buxton Sketch" pitchFamily="66" charset="0"/>
                 <a:cs typeface="Aharoni" pitchFamily="2" charset="-79"/>
               </a:rPr>
-              <a:t> </a:t>
-            </a:r>
-            <a:r>
-              <a:rPr lang="sk-SK" sz="3600" smtClean="0">
-                <a:solidFill>
-                  <a:schemeClr val="tx1">
-                    <a:lumMod val="75000"/>
-                    <a:lumOff val="25000"/>
-                  </a:schemeClr>
-                </a:solidFill>
-                <a:latin typeface="Buxton Sketch" pitchFamily="66" charset="0"/>
-                <a:cs typeface="Aharoni" pitchFamily="2" charset="-79"/>
-              </a:rPr>
-              <a:t>structure</a:t>
-            </a:r>
-            <a:r>
-              <a:rPr lang="en-US" sz="3600" smtClean="0">
-                <a:solidFill>
-                  <a:schemeClr val="tx1">
-                    <a:lumMod val="75000"/>
-                    <a:lumOff val="25000"/>
-                  </a:schemeClr>
-                </a:solidFill>
-                <a:latin typeface="Buxton Sketch" pitchFamily="66" charset="0"/>
-                <a:cs typeface="Aharoni" pitchFamily="2" charset="-79"/>
-              </a:rPr>
-              <a:t> of</a:t>
-            </a:r>
-            <a:r>
-              <a:rPr lang="en-US" sz="3600" smtClean="0">
-                <a:solidFill>
-                  <a:schemeClr val="tx1">
-                    <a:lumMod val="75000"/>
-                    <a:lumOff val="25000"/>
-                  </a:schemeClr>
-                </a:solidFill>
-                <a:latin typeface="Buxton Sketch" pitchFamily="66" charset="0"/>
-                <a:cs typeface="Aharoni" pitchFamily="2" charset="-79"/>
-              </a:rPr>
-              <a:t> </a:t>
+              <a:t> of </a:t>
             </a:r>
             <a:r>
               <a:rPr lang="sk-SK" sz="3600" smtClean="0">
@@ -4977,10 +4902,10 @@
                 <a:latin typeface="Buxton Sketch" pitchFamily="66" charset="0"/>
                 <a:cs typeface="Aharoni" pitchFamily="2" charset="-79"/>
               </a:rPr>
-              <a:t>More </a:t>
-            </a:r>
-            <a:r>
-              <a:rPr lang="sk-SK" sz="3600" smtClean="0">
+              <a:t>More opened</a:t>
+            </a:r>
+            <a:r>
+              <a:rPr lang="en-US" sz="3600" smtClean="0">
                 <a:solidFill>
                   <a:schemeClr val="tx1">
                     <a:lumMod val="75000"/>
@@ -4990,10 +4915,10 @@
                 <a:latin typeface="Buxton Sketch" pitchFamily="66" charset="0"/>
                 <a:cs typeface="Aharoni" pitchFamily="2" charset="-79"/>
               </a:rPr>
-              <a:t>opened</a:t>
-            </a:r>
-            <a:r>
-              <a:rPr lang="en-US" sz="3600" smtClean="0">
+              <a:t> f</a:t>
+            </a:r>
+            <a:r>
+              <a:rPr lang="sk-SK" sz="3600" smtClean="0">
                 <a:solidFill>
                   <a:schemeClr val="tx1">
                     <a:lumMod val="75000"/>
@@ -5003,46 +4928,7 @@
                 <a:latin typeface="Buxton Sketch" pitchFamily="66" charset="0"/>
                 <a:cs typeface="Aharoni" pitchFamily="2" charset="-79"/>
               </a:rPr>
-              <a:t> </a:t>
-            </a:r>
-            <a:r>
-              <a:rPr lang="en-US" sz="3600" smtClean="0">
-                <a:solidFill>
-                  <a:schemeClr val="tx1">
-                    <a:lumMod val="75000"/>
-                    <a:lumOff val="25000"/>
-                  </a:schemeClr>
-                </a:solidFill>
-                <a:latin typeface="Buxton Sketch" pitchFamily="66" charset="0"/>
-                <a:cs typeface="Aharoni" pitchFamily="2" charset="-79"/>
-              </a:rPr>
-              <a:t>f</a:t>
-            </a:r>
-            <a:r>
-              <a:rPr lang="sk-SK" sz="3600" smtClean="0">
-                <a:solidFill>
-                  <a:schemeClr val="tx1">
-                    <a:lumMod val="75000"/>
-                    <a:lumOff val="25000"/>
-                  </a:schemeClr>
-                </a:solidFill>
-                <a:latin typeface="Buxton Sketch" pitchFamily="66" charset="0"/>
-                <a:cs typeface="Aharoni" pitchFamily="2" charset="-79"/>
-              </a:rPr>
-              <a:t>iles </a:t>
-            </a:r>
-            <a:r>
-              <a:rPr lang="sk-SK" sz="3600" smtClean="0">
-                <a:solidFill>
-                  <a:schemeClr val="tx1">
-                    <a:lumMod val="75000"/>
-                    <a:lumOff val="25000"/>
-                  </a:schemeClr>
-                </a:solidFill>
-                <a:latin typeface="Buxton Sketch" pitchFamily="66" charset="0"/>
-                <a:cs typeface="Aharoni" pitchFamily="2" charset="-79"/>
-              </a:rPr>
-              <a:t>in </a:t>
+              <a:t>iles in </a:t>
             </a:r>
             <a:r>
               <a:rPr lang="en-US" sz="3600" smtClean="0">
@@ -5100,20 +4986,7 @@
                 <a:latin typeface="Buxton Sketch" pitchFamily="66" charset="0"/>
                 <a:cs typeface="Aharoni" pitchFamily="2" charset="-79"/>
               </a:rPr>
-              <a:t> </a:t>
-            </a:r>
-            <a:r>
-              <a:rPr lang="sk-SK" sz="3600" smtClean="0">
-                <a:solidFill>
-                  <a:schemeClr val="tx1">
-                    <a:lumMod val="75000"/>
-                    <a:lumOff val="25000"/>
-                  </a:schemeClr>
-                </a:solidFill>
-                <a:latin typeface="Buxton Sketch" pitchFamily="66" charset="0"/>
-                <a:cs typeface="Aharoni" pitchFamily="2" charset="-79"/>
-              </a:rPr>
-              <a:t>Select and move </a:t>
+              <a:t> Select and move </a:t>
             </a:r>
             <a:r>
               <a:rPr lang="sk-SK" sz="3600" err="1" smtClean="0">
@@ -5189,16 +5062,6 @@
               </a:rPr>
               <a:t>Drag n drop whole blocks in and between files</a:t>
             </a:r>
-            <a:endParaRPr lang="en-US" sz="3600" smtClean="0">
-              <a:solidFill>
-                <a:schemeClr val="tx1">
-                  <a:lumMod val="75000"/>
-                  <a:lumOff val="25000"/>
-                </a:schemeClr>
-              </a:solidFill>
-              <a:latin typeface="Buxton Sketch" pitchFamily="66" charset="0"/>
-              <a:cs typeface="Aharoni" pitchFamily="2" charset="-79"/>
-            </a:endParaRPr>
           </a:p>
           <a:p>
             <a:pPr>
@@ -5258,20 +5121,7 @@
                 <a:latin typeface="Buxton Sketch" pitchFamily="66" charset="0"/>
                 <a:cs typeface="Aharoni" pitchFamily="2" charset="-79"/>
               </a:rPr>
-              <a:t> </a:t>
-            </a:r>
-            <a:r>
-              <a:rPr lang="sk-SK" sz="3600" smtClean="0">
-                <a:solidFill>
-                  <a:schemeClr val="tx1">
-                    <a:lumMod val="75000"/>
-                    <a:lumOff val="25000"/>
-                  </a:schemeClr>
-                </a:solidFill>
-                <a:latin typeface="Buxton Sketch" pitchFamily="66" charset="0"/>
-                <a:cs typeface="Aharoni" pitchFamily="2" charset="-79"/>
-              </a:rPr>
-              <a:t>files </a:t>
+              <a:t> files </a:t>
             </a:r>
             <a:r>
               <a:rPr lang="sk-SK" sz="3600" dirty="0" smtClean="0">
@@ -5459,20 +5309,7 @@
                 <a:latin typeface="Buxton Sketch" pitchFamily="66" charset="0"/>
                 <a:cs typeface="Aharoni" pitchFamily="2" charset="-79"/>
               </a:rPr>
-              <a:t>Write documentation into </a:t>
-            </a:r>
-            <a:r>
-              <a:rPr lang="sk-SK" sz="3600" smtClean="0">
-                <a:solidFill>
-                  <a:schemeClr val="tx1">
-                    <a:lumMod val="75000"/>
-                    <a:lumOff val="25000"/>
-                  </a:schemeClr>
-                </a:solidFill>
-                <a:latin typeface="Buxton Sketch" pitchFamily="66" charset="0"/>
-                <a:cs typeface="Aharoni" pitchFamily="2" charset="-79"/>
-              </a:rPr>
-              <a:t>code </a:t>
+              <a:t>Write documentation into code </a:t>
             </a:r>
             <a:endParaRPr lang="en-US" sz="3600" smtClean="0">
               <a:solidFill>
@@ -5510,10 +5347,10 @@
                 <a:latin typeface="Buxton Sketch" pitchFamily="66" charset="0"/>
                 <a:cs typeface="Aharoni" pitchFamily="2" charset="-79"/>
               </a:rPr>
-              <a:t>(Literate </a:t>
-            </a:r>
-            <a:r>
-              <a:rPr lang="sk-SK" sz="3600" smtClean="0">
+              <a:t>(Literate programming </a:t>
+            </a:r>
+            <a:r>
+              <a:rPr lang="en-US" sz="3600" smtClean="0">
                 <a:solidFill>
                   <a:schemeClr val="tx1">
                     <a:lumMod val="75000"/>
@@ -5523,10 +5360,10 @@
                 <a:latin typeface="Buxton Sketch" pitchFamily="66" charset="0"/>
                 <a:cs typeface="Aharoni" pitchFamily="2" charset="-79"/>
               </a:rPr>
-              <a:t>programming </a:t>
-            </a:r>
-            <a:r>
-              <a:rPr lang="en-US" sz="3600" smtClean="0">
+              <a:t>by</a:t>
+            </a:r>
+            <a:r>
+              <a:rPr lang="sk-SK" sz="3600" smtClean="0">
                 <a:solidFill>
                   <a:schemeClr val="tx1">
                     <a:lumMod val="75000"/>
@@ -5536,33 +5373,7 @@
                 <a:latin typeface="Buxton Sketch" pitchFamily="66" charset="0"/>
                 <a:cs typeface="Aharoni" pitchFamily="2" charset="-79"/>
               </a:rPr>
-              <a:t>by</a:t>
-            </a:r>
-            <a:r>
-              <a:rPr lang="sk-SK" sz="3600" smtClean="0">
-                <a:solidFill>
-                  <a:schemeClr val="tx1">
-                    <a:lumMod val="75000"/>
-                    <a:lumOff val="25000"/>
-                  </a:schemeClr>
-                </a:solidFill>
-                <a:latin typeface="Buxton Sketch" pitchFamily="66" charset="0"/>
-                <a:cs typeface="Aharoni" pitchFamily="2" charset="-79"/>
-              </a:rPr>
-              <a:t> D. Knuth</a:t>
-            </a:r>
-            <a:r>
-              <a:rPr lang="sk-SK" sz="3600" smtClean="0">
-                <a:solidFill>
-                  <a:schemeClr val="tx1">
-                    <a:lumMod val="75000"/>
-                    <a:lumOff val="25000"/>
-                  </a:schemeClr>
-                </a:solidFill>
-                <a:latin typeface="Buxton Sketch" pitchFamily="66" charset="0"/>
-                <a:cs typeface="Aharoni" pitchFamily="2" charset="-79"/>
-              </a:rPr>
-              <a:t>) </a:t>
+              <a:t> D. Knuth) </a:t>
             </a:r>
             <a:endParaRPr lang="en-US" sz="3600" smtClean="0">
               <a:solidFill>
@@ -5629,33 +5440,7 @@
                 <a:latin typeface="Buxton Sketch" pitchFamily="66" charset="0"/>
                 <a:cs typeface="Aharoni" pitchFamily="2" charset="-79"/>
               </a:rPr>
-              <a:t>ork  </a:t>
-            </a:r>
-            <a:r>
-              <a:rPr lang="sk-SK" sz="3600" smtClean="0">
-                <a:solidFill>
-                  <a:schemeClr val="tx1">
-                    <a:lumMod val="75000"/>
-                    <a:lumOff val="25000"/>
-                  </a:schemeClr>
-                </a:solidFill>
-                <a:latin typeface="Buxton Sketch" pitchFamily="66" charset="0"/>
-                <a:cs typeface="Aharoni" pitchFamily="2" charset="-79"/>
-              </a:rPr>
-              <a:t>in  two </a:t>
-            </a:r>
-            <a:r>
-              <a:rPr lang="sk-SK" sz="3600" smtClean="0">
-                <a:solidFill>
-                  <a:schemeClr val="tx1">
-                    <a:lumMod val="75000"/>
-                    <a:lumOff val="25000"/>
-                  </a:schemeClr>
-                </a:solidFill>
-                <a:latin typeface="Buxton Sketch" pitchFamily="66" charset="0"/>
-                <a:cs typeface="Aharoni" pitchFamily="2" charset="-79"/>
-              </a:rPr>
-              <a:t>modes </a:t>
+              <a:t>ork  in  two modes </a:t>
             </a:r>
             <a:r>
               <a:rPr lang="en-US" sz="3600" smtClean="0">
@@ -5720,10 +5505,10 @@
                 <a:latin typeface="Buxton Sketch" pitchFamily="66" charset="0"/>
                 <a:cs typeface="Aharoni" pitchFamily="2" charset="-79"/>
               </a:rPr>
-              <a:t>as </a:t>
-            </a:r>
-            <a:r>
-              <a:rPr lang="sk-SK" sz="3600" smtClean="0">
+              <a:t>as simple  text  </a:t>
+            </a:r>
+            <a:r>
+              <a:rPr lang="en-US" sz="3600" smtClean="0">
                 <a:solidFill>
                   <a:schemeClr val="tx1">
                     <a:lumMod val="75000"/>
@@ -5733,7 +5518,7 @@
                 <a:latin typeface="Buxton Sketch" pitchFamily="66" charset="0"/>
                 <a:cs typeface="Aharoni" pitchFamily="2" charset="-79"/>
               </a:rPr>
-              <a:t>simple  </a:t>
+              <a:t>&lt; - &gt;</a:t>
             </a:r>
             <a:r>
               <a:rPr lang="sk-SK" sz="3600" smtClean="0">
@@ -5746,46 +5531,7 @@
                 <a:latin typeface="Buxton Sketch" pitchFamily="66" charset="0"/>
                 <a:cs typeface="Aharoni" pitchFamily="2" charset="-79"/>
               </a:rPr>
-              <a:t>text  </a:t>
-            </a:r>
-            <a:r>
-              <a:rPr lang="en-US" sz="3600" smtClean="0">
-                <a:solidFill>
-                  <a:schemeClr val="tx1">
-                    <a:lumMod val="75000"/>
-                    <a:lumOff val="25000"/>
-                  </a:schemeClr>
-                </a:solidFill>
-                <a:latin typeface="Buxton Sketch" pitchFamily="66" charset="0"/>
-                <a:cs typeface="Aharoni" pitchFamily="2" charset="-79"/>
-              </a:rPr>
-              <a:t>&lt; - &gt;</a:t>
-            </a:r>
-            <a:r>
-              <a:rPr lang="sk-SK" sz="3600" smtClean="0">
-                <a:solidFill>
-                  <a:schemeClr val="tx1">
-                    <a:lumMod val="75000"/>
-                    <a:lumOff val="25000"/>
-                  </a:schemeClr>
-                </a:solidFill>
-                <a:latin typeface="Buxton Sketch" pitchFamily="66" charset="0"/>
-                <a:cs typeface="Aharoni" pitchFamily="2" charset="-79"/>
-              </a:rPr>
-              <a:t> </a:t>
-            </a:r>
-            <a:r>
-              <a:rPr lang="sk-SK" sz="3600" smtClean="0">
-                <a:solidFill>
-                  <a:schemeClr val="tx1">
-                    <a:lumMod val="75000"/>
-                    <a:lumOff val="25000"/>
-                  </a:schemeClr>
-                </a:solidFill>
-                <a:latin typeface="Buxton Sketch" pitchFamily="66" charset="0"/>
-                <a:cs typeface="Aharoni" pitchFamily="2" charset="-79"/>
-              </a:rPr>
-              <a:t>with graphical  elements  </a:t>
+              <a:t> with graphical  elements  </a:t>
             </a:r>
           </a:p>
           <a:p>
@@ -5922,20 +5668,7 @@
                 <a:latin typeface="Buxton Sketch" pitchFamily="66" charset="0"/>
                 <a:cs typeface="Aharoni" pitchFamily="2" charset="-79"/>
               </a:rPr>
-              <a:t>to </a:t>
-            </a:r>
-            <a:r>
-              <a:rPr lang="sk-SK" sz="6000" b="1" smtClean="0">
-                <a:solidFill>
-                  <a:schemeClr val="tx1">
-                    <a:lumMod val="75000"/>
-                    <a:lumOff val="25000"/>
-                  </a:schemeClr>
-                </a:solidFill>
-                <a:latin typeface="Buxton Sketch" pitchFamily="66" charset="0"/>
-                <a:cs typeface="Aharoni" pitchFamily="2" charset="-79"/>
-              </a:rPr>
-              <a:t>use </a:t>
+              <a:t>to use </a:t>
             </a:r>
             <a:r>
               <a:rPr lang="sk-SK" sz="6000" b="1" dirty="0" smtClean="0">
@@ -6186,11 +5919,7 @@
             </a:r>
             <a:r>
               <a:rPr lang="sk-SK" sz="2800" i="1" smtClean="0"/>
-              <a:t>Nothing is impossible when the work is also a </a:t>
-            </a:r>
-            <a:r>
-              <a:rPr lang="sk-SK" sz="2800" i="1" smtClean="0"/>
-              <a:t>hobby</a:t>
+              <a:t>Nothing is impossible when the work is also a hobby</a:t>
             </a:r>
             <a:r>
               <a:rPr lang="sk-SK" sz="2800" smtClean="0"/>
@@ -6206,25 +5935,8 @@
             <a:pPr algn="just"/>
             <a:r>
               <a:rPr lang="en-US" sz="2400" smtClean="0"/>
-              <a:t>Our main goal to achieve is to create a real product, which will be a helpfull alternative to common text editors on </a:t>
-            </a:r>
-            <a:r>
-              <a:rPr lang="en-US" sz="2400" smtClean="0"/>
-              <a:t>market</a:t>
-            </a:r>
-            <a:r>
-              <a:rPr lang="en-US" sz="2400" smtClean="0"/>
-              <a:t>. We </a:t>
-            </a:r>
-            <a:r>
-              <a:rPr lang="en-US" sz="2400" smtClean="0"/>
-              <a:t>want to ensure that TrollEdit will be an original and very practical editor designated with extensibility, efficiency and flexibility in mind</a:t>
-            </a:r>
-            <a:r>
-              <a:rPr lang="en-US" sz="2400" smtClean="0"/>
-              <a:t>. </a:t>
-            </a:r>
-            <a:endParaRPr lang="en-US" sz="2400" smtClean="0"/>
+              <a:t>Our main goal to achieve is to create a real product, which will be a helpfull alternative to common text editors on market. We want to ensure that TrollEdit will be an original and very practical editor designated with extensibility, efficiency and flexibility in mind. </a:t>
+            </a:r>
           </a:p>
           <a:p>
             <a:pPr algn="just"/>
@@ -6245,15 +5957,7 @@
             <a:pPr algn="just"/>
             <a:r>
               <a:rPr lang="en-US" sz="2400" smtClean="0"/>
-              <a:t>Despite the facts work on editor is still in progress so feel free to contribute so we can create even </a:t>
-            </a:r>
-            <a:r>
-              <a:rPr lang="en-US" sz="2400" smtClean="0"/>
-              <a:t>better </a:t>
-            </a:r>
-            <a:r>
-              <a:rPr lang="en-US" sz="2400" smtClean="0"/>
-              <a:t>TrollEdit.</a:t>
+              <a:t>Despite the facts work on editor is still in progress so feel free to contribute so we can create even better TrollEdit.</a:t>
             </a:r>
           </a:p>
           <a:p>
@@ -6264,11 +5968,7 @@
             </a:pPr>
             <a:r>
               <a:rPr lang="en-US" sz="2400" smtClean="0"/>
-              <a:t>	</a:t>
-            </a:r>
-            <a:r>
-              <a:rPr lang="en-US" sz="2400" smtClean="0"/>
-              <a:t>Team Innovators</a:t>
+              <a:t>	Team Innovators</a:t>
             </a:r>
             <a:endParaRPr lang="sk-SK" sz="2800" dirty="0" smtClean="0"/>
           </a:p>
@@ -6801,6 +6501,244 @@
           </p:txBody>
         </p:sp>
       </p:grpSp>
+      <p:pic>
+        <p:nvPicPr>
+          <p:cNvPr id="4" name="Picture 3" descr="D:\FIIT\ING1-ZS\Timovy Projekt\TrollEdit_GitHub\Docs_Repo_SmartGit\Dokumentacie\Ostatne\Poster\Screens_TrollEdit\Main_window_bigger.tif"/>
+          <p:cNvPicPr>
+            <a:picLocks noChangeAspect="1" noChangeArrowheads="1"/>
+          </p:cNvPicPr>
+          <p:nvPr/>
+        </p:nvPicPr>
+        <p:blipFill>
+          <a:blip r:embed="rId25"/>
+          <a:srcRect/>
+          <a:stretch>
+            <a:fillRect/>
+          </a:stretch>
+        </p:blipFill>
+        <p:spPr bwMode="auto">
+          <a:xfrm>
+            <a:off x="9494798" y="10328197"/>
+            <a:ext cx="11404094" cy="8786874"/>
+          </a:xfrm>
+          <a:prstGeom prst="rect">
+            <a:avLst/>
+          </a:prstGeom>
+          <a:noFill/>
+        </p:spPr>
+      </p:pic>
+      <p:pic>
+        <p:nvPicPr>
+          <p:cNvPr id="95" name="Obrázok 94" descr="trollEdit-start_page.png"/>
+          <p:cNvPicPr>
+            <a:picLocks noChangeAspect="1"/>
+          </p:cNvPicPr>
+          <p:nvPr/>
+        </p:nvPicPr>
+        <p:blipFill>
+          <a:blip r:embed="rId26" cstate="print">
+            <a:duotone>
+              <a:schemeClr val="bg2">
+                <a:shade val="45000"/>
+                <a:satMod val="135000"/>
+              </a:schemeClr>
+              <a:prstClr val="white"/>
+            </a:duotone>
+          </a:blip>
+          <a:stretch>
+            <a:fillRect/>
+          </a:stretch>
+        </p:blipFill>
+        <p:spPr>
+          <a:xfrm rot="21393266">
+            <a:off x="6805899" y="18044378"/>
+            <a:ext cx="2434486" cy="929985"/>
+          </a:xfrm>
+          <a:prstGeom prst="rect">
+            <a:avLst/>
+          </a:prstGeom>
+        </p:spPr>
+      </p:pic>
+      <p:pic>
+        <p:nvPicPr>
+          <p:cNvPr id="1028" name="Picture 4" descr="D:\FIIT\ING1-ZS\Timovy Projekt\TrollEdit_GitHub\Docs_Repo_SmartGit\Dokumentacie\Ostatne\Poster\Screens_TrollEdit\Main2_2_big.tif"/>
+          <p:cNvPicPr>
+            <a:picLocks noChangeAspect="1" noChangeArrowheads="1"/>
+          </p:cNvPicPr>
+          <p:nvPr/>
+        </p:nvPicPr>
+        <p:blipFill>
+          <a:blip r:embed="rId27"/>
+          <a:srcRect/>
+          <a:stretch>
+            <a:fillRect/>
+          </a:stretch>
+        </p:blipFill>
+        <p:spPr bwMode="auto">
+          <a:xfrm>
+            <a:off x="9637674" y="11471205"/>
+            <a:ext cx="7814551" cy="5970563"/>
+          </a:xfrm>
+          <a:prstGeom prst="rect">
+            <a:avLst/>
+          </a:prstGeom>
+          <a:noFill/>
+        </p:spPr>
+      </p:pic>
+      <p:pic>
+        <p:nvPicPr>
+          <p:cNvPr id="1029" name="Picture 5" descr="D:\FIIT\ING1-ZS\Timovy Projekt\TrollEdit_GitHub\Docs_Repo_SmartGit\Dokumentacie\Ostatne\Poster\Screens_TrollEdit\Main1_hover_big.tif"/>
+          <p:cNvPicPr>
+            <a:picLocks noChangeAspect="1" noChangeArrowheads="1"/>
+          </p:cNvPicPr>
+          <p:nvPr/>
+        </p:nvPicPr>
+        <p:blipFill>
+          <a:blip r:embed="rId28"/>
+          <a:srcRect/>
+          <a:stretch>
+            <a:fillRect/>
+          </a:stretch>
+        </p:blipFill>
+        <p:spPr bwMode="auto">
+          <a:xfrm>
+            <a:off x="14209706" y="15828923"/>
+            <a:ext cx="6696913" cy="3065448"/>
+          </a:xfrm>
+          <a:prstGeom prst="rect">
+            <a:avLst/>
+          </a:prstGeom>
+          <a:noFill/>
+        </p:spPr>
+      </p:pic>
+      <p:pic>
+        <p:nvPicPr>
+          <p:cNvPr id="1030" name="Picture 6" descr="D:\FIIT\ING1-ZS\Timovy Projekt\TrollEdit_GitHub\Docs_Repo_SmartGit\Dokumentacie\Ostatne\Poster\Img\Techonologies1.tif"/>
+          <p:cNvPicPr>
+            <a:picLocks noChangeAspect="1" noChangeArrowheads="1"/>
+          </p:cNvPicPr>
+          <p:nvPr/>
+        </p:nvPicPr>
+        <p:blipFill>
+          <a:blip r:embed="rId29"/>
+          <a:srcRect/>
+          <a:stretch>
+            <a:fillRect/>
+          </a:stretch>
+        </p:blipFill>
+        <p:spPr bwMode="auto">
+          <a:xfrm>
+            <a:off x="0" y="37974703"/>
+            <a:ext cx="10718800" cy="2946400"/>
+          </a:xfrm>
+          <a:prstGeom prst="rect">
+            <a:avLst/>
+          </a:prstGeom>
+          <a:noFill/>
+        </p:spPr>
+      </p:pic>
+      <p:sp>
+        <p:nvSpPr>
+          <p:cNvPr id="104" name="BlokTextu 103"/>
+          <p:cNvSpPr txBox="1"/>
+          <p:nvPr/>
+        </p:nvSpPr>
+        <p:spPr>
+          <a:xfrm rot="21384659">
+            <a:off x="2868066" y="39781612"/>
+            <a:ext cx="5256584" cy="707886"/>
+          </a:xfrm>
+          <a:prstGeom prst="rect">
+            <a:avLst/>
+          </a:prstGeom>
+          <a:noFill/>
+        </p:spPr>
+        <p:txBody>
+          <a:bodyPr wrap="square" rtlCol="0">
+            <a:spAutoFit/>
+          </a:bodyPr>
+          <a:lstStyle/>
+          <a:p>
+            <a:r>
+              <a:rPr lang="sk-SK" sz="3600" b="1" i="1" dirty="0" smtClean="0">
+                <a:effectLst>
+                  <a:outerShdw blurRad="38100" dist="38100" dir="2700000" algn="tl">
+                    <a:srgbClr val="000000">
+                      <a:alpha val="43137"/>
+                    </a:srgbClr>
+                  </a:outerShdw>
+                </a:effectLst>
+              </a:rPr>
+              <a:t>       </a:t>
+            </a:r>
+            <a:r>
+              <a:rPr lang="sk-SK" sz="3600" b="1" i="1" dirty="0" err="1" smtClean="0">
+                <a:effectLst>
+                  <a:outerShdw blurRad="38100" dist="38100" dir="2700000" algn="tl">
+                    <a:srgbClr val="000000">
+                      <a:alpha val="43137"/>
+                    </a:srgbClr>
+                  </a:outerShdw>
+                </a:effectLst>
+              </a:rPr>
+              <a:t>Used</a:t>
+            </a:r>
+            <a:r>
+              <a:rPr lang="sk-SK" sz="3600" b="1" i="1" dirty="0" smtClean="0">
+                <a:effectLst>
+                  <a:outerShdw blurRad="38100" dist="38100" dir="2700000" algn="tl">
+                    <a:srgbClr val="000000">
+                      <a:alpha val="43137"/>
+                    </a:srgbClr>
+                  </a:outerShdw>
+                </a:effectLst>
+              </a:rPr>
+              <a:t> </a:t>
+            </a:r>
+            <a:r>
+              <a:rPr lang="sk-SK" sz="4000" b="1" i="1" dirty="0" err="1" smtClean="0">
+                <a:effectLst>
+                  <a:outerShdw blurRad="38100" dist="38100" dir="2700000" algn="tl">
+                    <a:srgbClr val="000000">
+                      <a:alpha val="43137"/>
+                    </a:srgbClr>
+                  </a:outerShdw>
+                </a:effectLst>
+              </a:rPr>
+              <a:t>technology</a:t>
+            </a:r>
+            <a:r>
+              <a:rPr lang="sk-SK" sz="3600" b="1" i="1" dirty="0" smtClean="0">
+                <a:effectLst>
+                  <a:outerShdw blurRad="38100" dist="38100" dir="2700000" algn="tl">
+                    <a:srgbClr val="000000">
+                      <a:alpha val="43137"/>
+                    </a:srgbClr>
+                  </a:outerShdw>
+                </a:effectLst>
+              </a:rPr>
+              <a:t> </a:t>
+            </a:r>
+            <a:r>
+              <a:rPr lang="sk-SK" sz="2400" b="1" i="1" dirty="0" smtClean="0">
+                <a:effectLst>
+                  <a:outerShdw blurRad="38100" dist="38100" dir="2700000" algn="tl">
+                    <a:srgbClr val="000000">
+                      <a:alpha val="43137"/>
+                    </a:srgbClr>
+                  </a:outerShdw>
+                </a:effectLst>
+              </a:rPr>
+              <a:t> </a:t>
+            </a:r>
+            <a:r>
+              <a:rPr lang="sk-SK" sz="2400" i="1" dirty="0" smtClean="0"/>
+              <a:t> </a:t>
+            </a:r>
+            <a:endParaRPr lang="sk-SK" sz="2400" i="1" dirty="0"/>
+          </a:p>
+        </p:txBody>
+      </p:sp>
       <p:graphicFrame>
         <p:nvGraphicFramePr>
           <p:cNvPr id="88" name="Tabuľka 87"/>
@@ -6817,6 +6755,7 @@
           <a:graphicData uri="http://schemas.openxmlformats.org/drawingml/2006/table">
             <a:tbl>
               <a:tblPr firstRow="1" bandRow="1">
+                <a:effectLst/>
                 <a:tableStyleId>{2D5ABB26-0587-4C30-8999-92F81FD0307C}</a:tableStyleId>
               </a:tblPr>
               <a:tblGrid>
@@ -6880,23 +6819,18 @@
                           <a:solidFill>
                             <a:prstClr val="black"/>
                           </a:solidFill>
-                          <a:effectLst>
-                            <a:outerShdw blurRad="38100" dist="38100" dir="2700000" algn="tl">
-                              <a:srgbClr val="000000">
-                                <a:alpha val="43137"/>
-                              </a:srgbClr>
-                            </a:outerShdw>
-                          </a:effectLst>
+                          <a:effectLst/>
                           <a:uLnTx/>
                           <a:uFillTx/>
-                          <a:latin typeface="+mj-lt"/>
+                          <a:latin typeface="+mn-lt"/>
                           <a:ea typeface="+mn-ea"/>
                           <a:cs typeface="+mn-cs"/>
                         </a:rPr>
                         <a:t>OverView</a:t>
                       </a:r>
                       <a:endParaRPr lang="sk-SK">
-                        <a:latin typeface="+mj-lt"/>
+                        <a:effectLst/>
+                        <a:latin typeface="+mn-lt"/>
                       </a:endParaRPr>
                     </a:p>
                   </a:txBody>
@@ -7160,6 +7094,14 @@
                       <a:headEnd type="none" w="med" len="med"/>
                       <a:tailEnd type="none" w="med" len="med"/>
                     </a:lnB>
+                    <a:lnTlToBr w="12700" cmpd="sng">
+                      <a:noFill/>
+                      <a:prstDash val="solid"/>
+                    </a:lnTlToBr>
+                    <a:lnBlToTr w="12700" cmpd="sng">
+                      <a:noFill/>
+                      <a:prstDash val="solid"/>
+                    </a:lnBlToTr>
                   </a:tcPr>
                 </a:tc>
                 <a:tc>
@@ -7233,244 +7175,6 @@
           </a:graphicData>
         </a:graphic>
       </p:graphicFrame>
-      <p:pic>
-        <p:nvPicPr>
-          <p:cNvPr id="4" name="Picture 3" descr="D:\FIIT\ING1-ZS\Timovy Projekt\TrollEdit_GitHub\Docs_Repo_SmartGit\Dokumentacie\Ostatne\Poster\Screens_TrollEdit\Main_window_bigger.tif"/>
-          <p:cNvPicPr>
-            <a:picLocks noChangeAspect="1" noChangeArrowheads="1"/>
-          </p:cNvPicPr>
-          <p:nvPr/>
-        </p:nvPicPr>
-        <p:blipFill>
-          <a:blip r:embed="rId25"/>
-          <a:srcRect/>
-          <a:stretch>
-            <a:fillRect/>
-          </a:stretch>
-        </p:blipFill>
-        <p:spPr bwMode="auto">
-          <a:xfrm>
-            <a:off x="9494798" y="10328197"/>
-            <a:ext cx="11404094" cy="8786874"/>
-          </a:xfrm>
-          <a:prstGeom prst="rect">
-            <a:avLst/>
-          </a:prstGeom>
-          <a:noFill/>
-        </p:spPr>
-      </p:pic>
-      <p:pic>
-        <p:nvPicPr>
-          <p:cNvPr id="95" name="Obrázok 94" descr="trollEdit-start_page.png"/>
-          <p:cNvPicPr>
-            <a:picLocks noChangeAspect="1"/>
-          </p:cNvPicPr>
-          <p:nvPr/>
-        </p:nvPicPr>
-        <p:blipFill>
-          <a:blip r:embed="rId26" cstate="print">
-            <a:duotone>
-              <a:schemeClr val="bg2">
-                <a:shade val="45000"/>
-                <a:satMod val="135000"/>
-              </a:schemeClr>
-              <a:prstClr val="white"/>
-            </a:duotone>
-          </a:blip>
-          <a:stretch>
-            <a:fillRect/>
-          </a:stretch>
-        </p:blipFill>
-        <p:spPr>
-          <a:xfrm rot="21393266">
-            <a:off x="6805899" y="18044378"/>
-            <a:ext cx="2434486" cy="929985"/>
-          </a:xfrm>
-          <a:prstGeom prst="rect">
-            <a:avLst/>
-          </a:prstGeom>
-        </p:spPr>
-      </p:pic>
-      <p:pic>
-        <p:nvPicPr>
-          <p:cNvPr id="1028" name="Picture 4" descr="D:\FIIT\ING1-ZS\Timovy Projekt\TrollEdit_GitHub\Docs_Repo_SmartGit\Dokumentacie\Ostatne\Poster\Screens_TrollEdit\Main2_2_big.tif"/>
-          <p:cNvPicPr>
-            <a:picLocks noChangeAspect="1" noChangeArrowheads="1"/>
-          </p:cNvPicPr>
-          <p:nvPr/>
-        </p:nvPicPr>
-        <p:blipFill>
-          <a:blip r:embed="rId27"/>
-          <a:srcRect/>
-          <a:stretch>
-            <a:fillRect/>
-          </a:stretch>
-        </p:blipFill>
-        <p:spPr bwMode="auto">
-          <a:xfrm>
-            <a:off x="9637674" y="11471205"/>
-            <a:ext cx="7814551" cy="5970563"/>
-          </a:xfrm>
-          <a:prstGeom prst="rect">
-            <a:avLst/>
-          </a:prstGeom>
-          <a:noFill/>
-        </p:spPr>
-      </p:pic>
-      <p:pic>
-        <p:nvPicPr>
-          <p:cNvPr id="1029" name="Picture 5" descr="D:\FIIT\ING1-ZS\Timovy Projekt\TrollEdit_GitHub\Docs_Repo_SmartGit\Dokumentacie\Ostatne\Poster\Screens_TrollEdit\Main1_hover_big.tif"/>
-          <p:cNvPicPr>
-            <a:picLocks noChangeAspect="1" noChangeArrowheads="1"/>
-          </p:cNvPicPr>
-          <p:nvPr/>
-        </p:nvPicPr>
-        <p:blipFill>
-          <a:blip r:embed="rId28"/>
-          <a:srcRect/>
-          <a:stretch>
-            <a:fillRect/>
-          </a:stretch>
-        </p:blipFill>
-        <p:spPr bwMode="auto">
-          <a:xfrm>
-            <a:off x="14209706" y="15828923"/>
-            <a:ext cx="6696913" cy="3065448"/>
-          </a:xfrm>
-          <a:prstGeom prst="rect">
-            <a:avLst/>
-          </a:prstGeom>
-          <a:noFill/>
-        </p:spPr>
-      </p:pic>
-      <p:pic>
-        <p:nvPicPr>
-          <p:cNvPr id="1030" name="Picture 6" descr="D:\FIIT\ING1-ZS\Timovy Projekt\TrollEdit_GitHub\Docs_Repo_SmartGit\Dokumentacie\Ostatne\Poster\Img\Techonologies1.tif"/>
-          <p:cNvPicPr>
-            <a:picLocks noChangeAspect="1" noChangeArrowheads="1"/>
-          </p:cNvPicPr>
-          <p:nvPr/>
-        </p:nvPicPr>
-        <p:blipFill>
-          <a:blip r:embed="rId29"/>
-          <a:srcRect/>
-          <a:stretch>
-            <a:fillRect/>
-          </a:stretch>
-        </p:blipFill>
-        <p:spPr bwMode="auto">
-          <a:xfrm>
-            <a:off x="0" y="37974703"/>
-            <a:ext cx="10718800" cy="2946400"/>
-          </a:xfrm>
-          <a:prstGeom prst="rect">
-            <a:avLst/>
-          </a:prstGeom>
-          <a:noFill/>
-        </p:spPr>
-      </p:pic>
-      <p:sp>
-        <p:nvSpPr>
-          <p:cNvPr id="104" name="BlokTextu 103"/>
-          <p:cNvSpPr txBox="1"/>
-          <p:nvPr/>
-        </p:nvSpPr>
-        <p:spPr>
-          <a:xfrm rot="21384659">
-            <a:off x="2868066" y="39781612"/>
-            <a:ext cx="5256584" cy="707886"/>
-          </a:xfrm>
-          <a:prstGeom prst="rect">
-            <a:avLst/>
-          </a:prstGeom>
-          <a:noFill/>
-        </p:spPr>
-        <p:txBody>
-          <a:bodyPr wrap="square" rtlCol="0">
-            <a:spAutoFit/>
-          </a:bodyPr>
-          <a:lstStyle/>
-          <a:p>
-            <a:r>
-              <a:rPr lang="sk-SK" sz="3600" b="1" i="1" dirty="0" smtClean="0">
-                <a:effectLst>
-                  <a:outerShdw blurRad="38100" dist="38100" dir="2700000" algn="tl">
-                    <a:srgbClr val="000000">
-                      <a:alpha val="43137"/>
-                    </a:srgbClr>
-                  </a:outerShdw>
-                </a:effectLst>
-              </a:rPr>
-              <a:t>       </a:t>
-            </a:r>
-            <a:r>
-              <a:rPr lang="sk-SK" sz="3600" b="1" i="1" dirty="0" err="1" smtClean="0">
-                <a:effectLst>
-                  <a:outerShdw blurRad="38100" dist="38100" dir="2700000" algn="tl">
-                    <a:srgbClr val="000000">
-                      <a:alpha val="43137"/>
-                    </a:srgbClr>
-                  </a:outerShdw>
-                </a:effectLst>
-              </a:rPr>
-              <a:t>Used</a:t>
-            </a:r>
-            <a:r>
-              <a:rPr lang="sk-SK" sz="3600" b="1" i="1" dirty="0" smtClean="0">
-                <a:effectLst>
-                  <a:outerShdw blurRad="38100" dist="38100" dir="2700000" algn="tl">
-                    <a:srgbClr val="000000">
-                      <a:alpha val="43137"/>
-                    </a:srgbClr>
-                  </a:outerShdw>
-                </a:effectLst>
-              </a:rPr>
-              <a:t> </a:t>
-            </a:r>
-            <a:r>
-              <a:rPr lang="sk-SK" sz="4000" b="1" i="1" dirty="0" err="1" smtClean="0">
-                <a:effectLst>
-                  <a:outerShdw blurRad="38100" dist="38100" dir="2700000" algn="tl">
-                    <a:srgbClr val="000000">
-                      <a:alpha val="43137"/>
-                    </a:srgbClr>
-                  </a:outerShdw>
-                </a:effectLst>
-              </a:rPr>
-              <a:t>technology</a:t>
-            </a:r>
-            <a:r>
-              <a:rPr lang="sk-SK" sz="3600" b="1" i="1" dirty="0" smtClean="0">
-                <a:effectLst>
-                  <a:outerShdw blurRad="38100" dist="38100" dir="2700000" algn="tl">
-                    <a:srgbClr val="000000">
-                      <a:alpha val="43137"/>
-                    </a:srgbClr>
-                  </a:outerShdw>
-                </a:effectLst>
-              </a:rPr>
-              <a:t> </a:t>
-            </a:r>
-            <a:r>
-              <a:rPr lang="sk-SK" sz="2400" b="1" i="1" dirty="0" smtClean="0">
-                <a:effectLst>
-                  <a:outerShdw blurRad="38100" dist="38100" dir="2700000" algn="tl">
-                    <a:srgbClr val="000000">
-                      <a:alpha val="43137"/>
-                    </a:srgbClr>
-                  </a:outerShdw>
-                </a:effectLst>
-              </a:rPr>
-              <a:t> </a:t>
-            </a:r>
-            <a:r>
-              <a:rPr lang="sk-SK" sz="2400" i="1" dirty="0" smtClean="0"/>
-              <a:t> </a:t>
-            </a:r>
-            <a:endParaRPr lang="sk-SK" sz="2400" i="1" dirty="0"/>
-          </a:p>
-        </p:txBody>
-      </p:sp>
     </p:spTree>
   </p:cSld>
   <p:clrMapOvr>

</xml_diff>

<commit_message>
[!] new version of poster
</commit_message>
<xml_diff>
--- a/Dokumentacie/Ostatne/Poster/poster2.pptx
+++ b/Dokumentacie/Ostatne/Poster/poster2.pptx
@@ -3050,6 +3050,14 @@
 <file path=ppt/slides/slide1.xml><?xml version="1.0" encoding="utf-8"?>
 <p:sld xmlns:a="http://schemas.openxmlformats.org/drawingml/2006/main" xmlns:r="http://schemas.openxmlformats.org/officeDocument/2006/relationships" xmlns:p="http://schemas.openxmlformats.org/presentationml/2006/main">
   <p:cSld>
+    <p:bg>
+      <p:bgPr>
+        <a:solidFill>
+          <a:schemeClr val="bg1"/>
+        </a:solidFill>
+        <a:effectLst/>
+      </p:bgPr>
+    </p:bg>
     <p:spTree>
       <p:nvGrpSpPr>
         <p:cNvPr id="1" name=""/>
@@ -3470,7 +3478,7 @@
         </p:nvSpPr>
         <p:spPr>
           <a:xfrm>
-            <a:off x="13410208" y="41995375"/>
+            <a:off x="13914264" y="42067383"/>
             <a:ext cx="3096344" cy="400110"/>
           </a:xfrm>
           <a:prstGeom prst="rect">
@@ -4167,8 +4175,8 @@
         </p:nvSpPr>
         <p:spPr>
           <a:xfrm rot="16200000">
-            <a:off x="20229973" y="10497004"/>
-            <a:ext cx="11456112" cy="8637542"/>
+            <a:off x="20409993" y="10677024"/>
+            <a:ext cx="11096072" cy="8637542"/>
           </a:xfrm>
           <a:prstGeom prst="round2SameRect">
             <a:avLst/>
@@ -4223,8 +4231,8 @@
         </p:blipFill>
         <p:spPr>
           <a:xfrm>
-            <a:off x="26371649" y="21401087"/>
-            <a:ext cx="2736304" cy="2122289"/>
+            <a:off x="26371648" y="21401087"/>
+            <a:ext cx="3024335" cy="2160239"/>
           </a:xfrm>
           <a:prstGeom prst="rect">
             <a:avLst/>
@@ -5725,7 +5733,7 @@
         </p:nvSpPr>
         <p:spPr>
           <a:xfrm>
-            <a:off x="22963546" y="9399503"/>
+            <a:off x="22915264" y="9663783"/>
             <a:ext cx="6605331" cy="1015663"/>
           </a:xfrm>
           <a:prstGeom prst="rect">
@@ -5763,20 +5771,20 @@
                 <a:latin typeface="Buxton Sketch" pitchFamily="66" charset="0"/>
                 <a:cs typeface="Aharoni" pitchFamily="2" charset="-79"/>
               </a:rPr>
-              <a:t> </a:t>
-            </a:r>
-            <a:r>
-              <a:rPr lang="sk-SK" sz="6000" b="1" smtClean="0">
-                <a:solidFill>
-                  <a:schemeClr val="tx1">
-                    <a:lumMod val="75000"/>
-                    <a:lumOff val="25000"/>
-                  </a:schemeClr>
-                </a:solidFill>
-                <a:latin typeface="Buxton Sketch" pitchFamily="66" charset="0"/>
-                <a:cs typeface="Aharoni" pitchFamily="2" charset="-79"/>
-              </a:rPr>
-              <a:t>to use </a:t>
+              <a:t> to </a:t>
+            </a:r>
+            <a:r>
+              <a:rPr lang="sk-SK" sz="6000" b="1" dirty="0" err="1" smtClean="0">
+                <a:solidFill>
+                  <a:schemeClr val="tx1">
+                    <a:lumMod val="75000"/>
+                    <a:lumOff val="25000"/>
+                  </a:schemeClr>
+                </a:solidFill>
+                <a:latin typeface="Buxton Sketch" pitchFamily="66" charset="0"/>
+                <a:cs typeface="Aharoni" pitchFamily="2" charset="-79"/>
+              </a:rPr>
+              <a:t>use</a:t>
             </a:r>
             <a:r>
               <a:rPr lang="sk-SK" sz="6000" b="1" dirty="0" smtClean="0">
@@ -5789,7 +5797,7 @@
                 <a:latin typeface="Buxton Sketch" pitchFamily="66" charset="0"/>
                 <a:cs typeface="Aharoni" pitchFamily="2" charset="-79"/>
               </a:rPr>
-              <a:t>TrollEdit?</a:t>
+              <a:t> TrollEdit?</a:t>
             </a:r>
           </a:p>
         </p:txBody>
@@ -5874,7 +5882,7 @@
         </p:blipFill>
         <p:spPr>
           <a:xfrm rot="13091555" flipH="1">
-            <a:off x="25894996" y="20445970"/>
+            <a:off x="25921169" y="20477244"/>
             <a:ext cx="1080170" cy="314348"/>
           </a:xfrm>
           <a:prstGeom prst="rect">
@@ -5890,8 +5898,8 @@
         </p:nvSpPr>
         <p:spPr>
           <a:xfrm rot="5400000" flipH="1">
-            <a:off x="3752776" y="27441399"/>
-            <a:ext cx="5400600" cy="12906152"/>
+            <a:off x="3500748" y="27333387"/>
+            <a:ext cx="5904656" cy="12906152"/>
           </a:xfrm>
           <a:prstGeom prst="round2SameRect">
             <a:avLst/>
@@ -5962,8 +5970,8 @@
         </p:nvSpPr>
         <p:spPr>
           <a:xfrm>
-            <a:off x="304752" y="31482207"/>
-            <a:ext cx="12385376" cy="5232202"/>
+            <a:off x="232744" y="30834135"/>
+            <a:ext cx="12512672" cy="6432530"/>
           </a:xfrm>
           <a:prstGeom prst="roundRect">
             <a:avLst>
@@ -6002,41 +6010,41 @@
           <a:p>
             <a:pPr algn="just"/>
             <a:r>
-              <a:rPr lang="en-US" sz="2400" dirty="0" smtClean="0"/>
+              <a:rPr lang="en-US" sz="2800" dirty="0" smtClean="0"/>
               <a:t>Our main goal to achieve is to create a real product, which will be a </a:t>
             </a:r>
             <a:r>
-              <a:rPr lang="en-US" sz="2400" dirty="0" err="1" smtClean="0"/>
+              <a:rPr lang="en-US" sz="2800" dirty="0" err="1" smtClean="0"/>
               <a:t>helpfull</a:t>
             </a:r>
             <a:r>
-              <a:rPr lang="en-US" sz="2400" dirty="0" smtClean="0"/>
+              <a:rPr lang="en-US" sz="2800" dirty="0" smtClean="0"/>
               <a:t> alternative to common text editors on market. We want to ensure that TrollEdit will be an original and very practical editor designated with extensibility, efficiency and flexibility in mind. </a:t>
             </a:r>
           </a:p>
           <a:p>
             <a:pPr algn="just"/>
-            <a:endParaRPr lang="en-US" sz="2400" dirty="0" smtClean="0"/>
+            <a:endParaRPr lang="en-US" sz="1000" dirty="0" smtClean="0"/>
           </a:p>
           <a:p>
             <a:pPr algn="just"/>
             <a:r>
-              <a:rPr lang="en-US" sz="2400" dirty="0" err="1" smtClean="0"/>
+              <a:rPr lang="en-US" sz="2800" dirty="0" err="1" smtClean="0"/>
               <a:t>ToDo</a:t>
             </a:r>
             <a:r>
-              <a:rPr lang="en-US" sz="2400" dirty="0" smtClean="0"/>
+              <a:rPr lang="en-US" sz="2800" dirty="0" smtClean="0"/>
               <a:t> list management, File trees, shortcuts configuration, parallelized run of text analysis and new appealing user interface are just some of the features witch were recently implemented into editor and it's still not over. We can always add new grammar for support of new languages without any invasion to editor, or create module to extend its core functionalities even more.</a:t>
             </a:r>
           </a:p>
           <a:p>
             <a:pPr algn="just"/>
-            <a:endParaRPr lang="en-US" sz="2400" dirty="0" smtClean="0"/>
+            <a:endParaRPr lang="en-US" sz="1050" dirty="0" smtClean="0"/>
           </a:p>
           <a:p>
             <a:pPr algn="just"/>
             <a:r>
-              <a:rPr lang="en-US" sz="2400" dirty="0" smtClean="0"/>
+              <a:rPr lang="en-US" sz="2800" dirty="0" smtClean="0"/>
               <a:t>Despite the facts work on editor is still in progress so feel free to contribute so we can create even better TrollEdit.</a:t>
             </a:r>
           </a:p>
@@ -6048,11 +6056,7 @@
             </a:pPr>
             <a:r>
               <a:rPr lang="sk-SK" sz="2400" dirty="0" smtClean="0"/>
-              <a:t> </a:t>
-            </a:r>
-            <a:r>
-              <a:rPr lang="sk-SK" sz="2400" dirty="0" smtClean="0"/>
-              <a:t>                                                                                                                                          </a:t>
+              <a:t>                                                                                                                                           </a:t>
             </a:r>
             <a:endParaRPr lang="sk-SK" sz="2800" dirty="0" smtClean="0"/>
           </a:p>
@@ -6106,54 +6110,6 @@
           </a:prstGeom>
         </p:spPr>
       </p:pic>
-      <p:pic>
-        <p:nvPicPr>
-          <p:cNvPr id="112" name="Obrázok 111" descr="plus.png"/>
-          <p:cNvPicPr>
-            <a:picLocks noChangeAspect="1"/>
-          </p:cNvPicPr>
-          <p:nvPr/>
-        </p:nvPicPr>
-        <p:blipFill>
-          <a:blip r:embed="rId18" cstate="print"/>
-          <a:stretch>
-            <a:fillRect/>
-          </a:stretch>
-        </p:blipFill>
-        <p:spPr>
-          <a:xfrm>
-            <a:off x="4265192" y="26945703"/>
-            <a:ext cx="1383296" cy="1296144"/>
-          </a:xfrm>
-          <a:prstGeom prst="rect">
-            <a:avLst/>
-          </a:prstGeom>
-        </p:spPr>
-      </p:pic>
-      <p:pic>
-        <p:nvPicPr>
-          <p:cNvPr id="113" name="Obrázok 112" descr="rovnasa.png"/>
-          <p:cNvPicPr>
-            <a:picLocks noChangeAspect="1"/>
-          </p:cNvPicPr>
-          <p:nvPr/>
-        </p:nvPicPr>
-        <p:blipFill>
-          <a:blip r:embed="rId19" cstate="print"/>
-          <a:stretch>
-            <a:fillRect/>
-          </a:stretch>
-        </p:blipFill>
-        <p:spPr>
-          <a:xfrm>
-            <a:off x="24715464" y="27449759"/>
-            <a:ext cx="1296144" cy="507905"/>
-          </a:xfrm>
-          <a:prstGeom prst="rect">
-            <a:avLst/>
-          </a:prstGeom>
-        </p:spPr>
-      </p:pic>
       <p:grpSp>
         <p:nvGrpSpPr>
           <p:cNvPr id="125" name="Skupina 124"/>
@@ -6162,8 +6118,8 @@
         </p:nvGrpSpPr>
         <p:grpSpPr>
           <a:xfrm>
-            <a:off x="24787472" y="25145503"/>
-            <a:ext cx="4772256" cy="5109666"/>
+            <a:off x="24787472" y="25505543"/>
+            <a:ext cx="4824536" cy="4464496"/>
             <a:chOff x="25075504" y="23345303"/>
             <a:chExt cx="4772256" cy="5109666"/>
           </a:xfrm>
@@ -6177,7 +6133,7 @@
             <p:nvPr/>
           </p:nvPicPr>
           <p:blipFill>
-            <a:blip r:embed="rId20" cstate="print"/>
+            <a:blip r:embed="rId18" cstate="print"/>
             <a:stretch>
               <a:fillRect/>
             </a:stretch>
@@ -6336,80 +6292,31 @@
           </a:prstGeom>
         </p:spPr>
       </p:pic>
-      <p:grpSp>
-        <p:nvGrpSpPr>
-          <p:cNvPr id="126" name="Skupina 125"/>
-          <p:cNvGrpSpPr/>
+      <p:sp>
+        <p:nvSpPr>
+          <p:cNvPr id="118" name="BlokTextu 117"/>
+          <p:cNvSpPr txBox="1"/>
           <p:nvPr/>
-        </p:nvGrpSpPr>
-        <p:grpSpPr>
+        </p:nvSpPr>
+        <p:spPr>
           <a:xfrm>
-            <a:off x="448768" y="25001487"/>
-            <a:ext cx="3819904" cy="5409312"/>
-            <a:chOff x="376760" y="22625223"/>
-            <a:chExt cx="4196664" cy="5409312"/>
-          </a:xfrm>
-        </p:grpSpPr>
-        <p:pic>
-          <p:nvPicPr>
-            <p:cNvPr id="111" name="Obrázok 110" descr="ddd.png"/>
-            <p:cNvPicPr>
-              <a:picLocks noChangeAspect="1"/>
-            </p:cNvPicPr>
-            <p:nvPr/>
-          </p:nvPicPr>
-          <p:blipFill>
-            <a:blip r:embed="rId21" cstate="print"/>
-            <a:stretch>
-              <a:fillRect/>
-            </a:stretch>
-          </p:blipFill>
-          <p:spPr>
-            <a:xfrm>
-              <a:off x="376760" y="22625223"/>
-              <a:ext cx="4196664" cy="4680520"/>
-            </a:xfrm>
-            <a:prstGeom prst="rect">
-              <a:avLst/>
-            </a:prstGeom>
-          </p:spPr>
-        </p:pic>
-        <p:sp>
-          <p:nvSpPr>
-            <p:cNvPr id="118" name="BlokTextu 117"/>
-            <p:cNvSpPr txBox="1"/>
-            <p:nvPr/>
-          </p:nvSpPr>
-          <p:spPr>
-            <a:xfrm>
-              <a:off x="736800" y="27449760"/>
-              <a:ext cx="2232248" cy="584775"/>
-            </a:xfrm>
-            <a:prstGeom prst="rect">
-              <a:avLst/>
-            </a:prstGeom>
-            <a:noFill/>
-          </p:spPr>
-          <p:txBody>
-            <a:bodyPr wrap="square" rtlCol="0">
-              <a:spAutoFit/>
-            </a:bodyPr>
-            <a:lstStyle/>
-            <a:p>
-              <a:pPr algn="ctr"/>
-              <a:r>
-                <a:rPr lang="sk-SK" sz="3200" b="1" dirty="0" err="1" smtClean="0">
-                  <a:solidFill>
-                    <a:schemeClr val="bg1">
-                      <a:lumMod val="50000"/>
-                    </a:schemeClr>
-                  </a:solidFill>
-                  <a:latin typeface="Buxton Sketch" pitchFamily="66" charset="0"/>
-                  <a:cs typeface="Aharoni" pitchFamily="2" charset="-79"/>
-                </a:rPr>
-                <a:t>Source</a:t>
-              </a:r>
-              <a:endParaRPr lang="sk-SK" sz="3200" b="1" dirty="0" smtClean="0">
+            <a:off x="1240856" y="29754015"/>
+            <a:ext cx="2031846" cy="584775"/>
+          </a:xfrm>
+          <a:prstGeom prst="rect">
+            <a:avLst/>
+          </a:prstGeom>
+          <a:noFill/>
+        </p:spPr>
+        <p:txBody>
+          <a:bodyPr wrap="square" rtlCol="0">
+            <a:spAutoFit/>
+          </a:bodyPr>
+          <a:lstStyle/>
+          <a:p>
+            <a:pPr algn="ctr"/>
+            <a:r>
+              <a:rPr lang="sk-SK" sz="3200" b="1" dirty="0" err="1" smtClean="0">
                 <a:solidFill>
                   <a:schemeClr val="bg1">
                     <a:lumMod val="50000"/>
@@ -6417,11 +6324,21 @@
                 </a:solidFill>
                 <a:latin typeface="Buxton Sketch" pitchFamily="66" charset="0"/>
                 <a:cs typeface="Aharoni" pitchFamily="2" charset="-79"/>
-              </a:endParaRPr>
-            </a:p>
-          </p:txBody>
-        </p:sp>
-      </p:grpSp>
+              </a:rPr>
+              <a:t>Source</a:t>
+            </a:r>
+            <a:endParaRPr lang="sk-SK" sz="3200" b="1" dirty="0" smtClean="0">
+              <a:solidFill>
+                <a:schemeClr val="bg1">
+                  <a:lumMod val="50000"/>
+                </a:schemeClr>
+              </a:solidFill>
+              <a:latin typeface="Buxton Sketch" pitchFamily="66" charset="0"/>
+              <a:cs typeface="Aharoni" pitchFamily="2" charset="-79"/>
+            </a:endParaRPr>
+          </a:p>
+        </p:txBody>
+      </p:sp>
       <p:grpSp>
         <p:nvGrpSpPr>
           <p:cNvPr id="124" name="Skupina 123"/>
@@ -6445,7 +6362,7 @@
             <p:nvPr/>
           </p:nvPicPr>
           <p:blipFill>
-            <a:blip r:embed="rId22" cstate="print"/>
+            <a:blip r:embed="rId19" cstate="print"/>
             <a:stretch>
               <a:fillRect/>
             </a:stretch>
@@ -6522,7 +6439,7 @@
             <p:nvPr/>
           </p:nvPicPr>
           <p:blipFill>
-            <a:blip r:embed="rId23" cstate="print"/>
+            <a:blip r:embed="rId20" cstate="print"/>
             <a:stretch>
               <a:fillRect/>
             </a:stretch>
@@ -6593,7 +6510,7 @@
         </p:nvSpPr>
         <p:spPr>
           <a:xfrm rot="5400000" flipH="1">
-            <a:off x="5241004" y="4206755"/>
+            <a:off x="5241004" y="4926835"/>
             <a:ext cx="10657184" cy="21139192"/>
           </a:xfrm>
           <a:prstGeom prst="round2SameRect">
@@ -6642,7 +6559,7 @@
           <p:nvPr/>
         </p:nvPicPr>
         <p:blipFill>
-          <a:blip r:embed="rId24" cstate="print"/>
+          <a:blip r:embed="rId21" cstate="print"/>
           <a:srcRect/>
           <a:stretch>
             <a:fillRect/>
@@ -6650,8 +6567,8 @@
         </p:blipFill>
         <p:spPr bwMode="auto">
           <a:xfrm>
-            <a:off x="565048" y="11474625"/>
-            <a:ext cx="7643866" cy="6065086"/>
+            <a:off x="880816" y="12544103"/>
+            <a:ext cx="7643866" cy="5904656"/>
           </a:xfrm>
           <a:prstGeom prst="rect">
             <a:avLst/>
@@ -6673,8 +6590,8 @@
         </p:nvSpPr>
         <p:spPr>
           <a:xfrm>
-            <a:off x="636486" y="9474361"/>
-            <a:ext cx="7429552" cy="1754326"/>
+            <a:off x="0" y="10455871"/>
+            <a:ext cx="9145016" cy="1938992"/>
           </a:xfrm>
           <a:prstGeom prst="rect">
             <a:avLst/>
@@ -6689,21 +6606,21 @@
           <a:p>
             <a:pPr algn="ctr"/>
             <a:r>
-              <a:rPr lang="en-US" sz="5400" b="1" dirty="0" smtClean="0">
+              <a:rPr lang="en-US" sz="6000" b="1" dirty="0" smtClean="0">
                 <a:latin typeface="+mj-lt"/>
                 <a:cs typeface="Arial" pitchFamily="34" charset="0"/>
               </a:rPr>
               <a:t>How classical text</a:t>
             </a:r>
             <a:r>
-              <a:rPr lang="sk-SK" sz="5400" b="1" dirty="0" smtClean="0">
+              <a:rPr lang="sk-SK" sz="6000" b="1" dirty="0" smtClean="0">
                 <a:latin typeface="+mj-lt"/>
                 <a:cs typeface="Arial" pitchFamily="34" charset="0"/>
               </a:rPr>
               <a:t> </a:t>
             </a:r>
             <a:r>
-              <a:rPr lang="en-US" sz="5400" b="1" dirty="0" smtClean="0">
+              <a:rPr lang="en-US" sz="6000" b="1" dirty="0" smtClean="0">
                 <a:latin typeface="+mj-lt"/>
                 <a:cs typeface="Arial" pitchFamily="34" charset="0"/>
               </a:rPr>
@@ -6713,13 +6630,13 @@
           <a:p>
             <a:pPr algn="ctr"/>
             <a:r>
-              <a:rPr lang="en-US" sz="5400" b="1" dirty="0" smtClean="0">
+              <a:rPr lang="en-US" sz="6000" b="1" dirty="0" smtClean="0">
                 <a:latin typeface="+mj-lt"/>
                 <a:cs typeface="Arial" pitchFamily="34" charset="0"/>
               </a:rPr>
               <a:t>see source code</a:t>
             </a:r>
-            <a:endParaRPr lang="sk-SK" sz="5400" b="1" dirty="0">
+            <a:endParaRPr lang="sk-SK" sz="6000" b="1" dirty="0">
               <a:latin typeface="+mj-lt"/>
               <a:cs typeface="Arial" pitchFamily="34" charset="0"/>
             </a:endParaRPr>
@@ -6734,7 +6651,7 @@
         </p:nvSpPr>
         <p:spPr>
           <a:xfrm>
-            <a:off x="1096840" y="17944703"/>
+            <a:off x="1096840" y="18520767"/>
             <a:ext cx="6696744" cy="1015663"/>
           </a:xfrm>
           <a:prstGeom prst="rect">
@@ -6785,7 +6702,7 @@
         </p:nvSpPr>
         <p:spPr>
           <a:xfrm>
-            <a:off x="1930350" y="19127611"/>
+            <a:off x="1888928" y="19600887"/>
             <a:ext cx="5503194" cy="769441"/>
           </a:xfrm>
           <a:prstGeom prst="rect">
@@ -6800,6 +6717,19 @@
           <a:lstStyle/>
           <a:p>
             <a:r>
+              <a:rPr lang="sk-SK" sz="4400" dirty="0" smtClean="0">
+                <a:solidFill>
+                  <a:schemeClr val="tx1">
+                    <a:lumMod val="75000"/>
+                    <a:lumOff val="25000"/>
+                  </a:schemeClr>
+                </a:solidFill>
+                <a:latin typeface="Buxton Sketch" pitchFamily="66" charset="0"/>
+                <a:cs typeface="Aharoni" pitchFamily="2" charset="-79"/>
+              </a:rPr>
+              <a:t> </a:t>
+            </a:r>
+            <a:r>
               <a:rPr lang="sk-SK" sz="4400" dirty="0" err="1" smtClean="0">
                 <a:solidFill>
                   <a:schemeClr val="tx1">
@@ -6888,8 +6818,8 @@
         </p:nvSpPr>
         <p:spPr>
           <a:xfrm>
-            <a:off x="9494799" y="9688675"/>
-            <a:ext cx="11287204" cy="923330"/>
+            <a:off x="9377760" y="10455871"/>
+            <a:ext cx="11287204" cy="1015663"/>
           </a:xfrm>
           <a:prstGeom prst="rect">
             <a:avLst/>
@@ -6904,13 +6834,25 @@
           <a:p>
             <a:pPr algn="ctr"/>
             <a:r>
-              <a:rPr lang="en-US" sz="5400" b="1" smtClean="0">
+              <a:rPr lang="en-US" sz="6000" b="1" dirty="0" smtClean="0">
+                <a:solidFill>
+                  <a:schemeClr val="tx1">
+                    <a:lumMod val="75000"/>
+                    <a:lumOff val="25000"/>
+                  </a:schemeClr>
+                </a:solidFill>
                 <a:latin typeface="+mj-lt"/>
                 <a:cs typeface="Arial" pitchFamily="34" charset="0"/>
               </a:rPr>
               <a:t>How TrollEdit see source code</a:t>
             </a:r>
-            <a:endParaRPr lang="sk-SK" sz="5400" b="1" dirty="0">
+            <a:endParaRPr lang="sk-SK" sz="6000" b="1" dirty="0">
+              <a:solidFill>
+                <a:schemeClr val="tx1">
+                  <a:lumMod val="75000"/>
+                  <a:lumOff val="25000"/>
+                </a:schemeClr>
+              </a:solidFill>
               <a:latin typeface="+mj-lt"/>
               <a:cs typeface="Arial" pitchFamily="34" charset="0"/>
             </a:endParaRPr>
@@ -6920,6 +6862,90 @@
       <p:pic>
         <p:nvPicPr>
           <p:cNvPr id="4" name="Picture 3" descr="D:\FIIT\ING1-ZS\Timovy Projekt\TrollEdit_GitHub\Docs_Repo_SmartGit\Dokumentacie\Ostatne\Poster\Screens_TrollEdit\Main_window_bigger.tif"/>
+          <p:cNvPicPr>
+            <a:picLocks noChangeAspect="1" noChangeArrowheads="1"/>
+          </p:cNvPicPr>
+          <p:nvPr/>
+        </p:nvPicPr>
+        <p:blipFill>
+          <a:blip r:embed="rId22" cstate="print"/>
+          <a:srcRect/>
+          <a:stretch>
+            <a:fillRect/>
+          </a:stretch>
+        </p:blipFill>
+        <p:spPr bwMode="auto">
+          <a:xfrm>
+            <a:off x="9377760" y="11752015"/>
+            <a:ext cx="11260226" cy="7904537"/>
+          </a:xfrm>
+          <a:prstGeom prst="rect">
+            <a:avLst/>
+          </a:prstGeom>
+          <a:noFill/>
+        </p:spPr>
+      </p:pic>
+      <p:pic>
+        <p:nvPicPr>
+          <p:cNvPr id="95" name="Obrázok 94" descr="trollEdit-start_page.png"/>
+          <p:cNvPicPr>
+            <a:picLocks noChangeAspect="1"/>
+          </p:cNvPicPr>
+          <p:nvPr/>
+        </p:nvPicPr>
+        <p:blipFill>
+          <a:blip r:embed="rId23" cstate="print">
+            <a:duotone>
+              <a:schemeClr val="bg2">
+                <a:shade val="45000"/>
+                <a:satMod val="135000"/>
+              </a:schemeClr>
+              <a:prstClr val="white"/>
+            </a:duotone>
+          </a:blip>
+          <a:stretch>
+            <a:fillRect/>
+          </a:stretch>
+        </p:blipFill>
+        <p:spPr>
+          <a:xfrm rot="21393266">
+            <a:off x="6877473" y="19369010"/>
+            <a:ext cx="1890462" cy="722166"/>
+          </a:xfrm>
+          <a:prstGeom prst="rect">
+            <a:avLst/>
+          </a:prstGeom>
+        </p:spPr>
+      </p:pic>
+      <p:pic>
+        <p:nvPicPr>
+          <p:cNvPr id="1028" name="Picture 4" descr="D:\FIIT\ING1-ZS\Timovy Projekt\TrollEdit_GitHub\Docs_Repo_SmartGit\Dokumentacie\Ostatne\Poster\Screens_TrollEdit\Main2_2_big.tif"/>
+          <p:cNvPicPr>
+            <a:picLocks noChangeAspect="1" noChangeArrowheads="1"/>
+          </p:cNvPicPr>
+          <p:nvPr/>
+        </p:nvPicPr>
+        <p:blipFill>
+          <a:blip r:embed="rId24" cstate="print"/>
+          <a:srcRect/>
+          <a:stretch>
+            <a:fillRect/>
+          </a:stretch>
+        </p:blipFill>
+        <p:spPr bwMode="auto">
+          <a:xfrm>
+            <a:off x="9593784" y="12976151"/>
+            <a:ext cx="6580845" cy="5681410"/>
+          </a:xfrm>
+          <a:prstGeom prst="rect">
+            <a:avLst/>
+          </a:prstGeom>
+          <a:noFill/>
+        </p:spPr>
+      </p:pic>
+      <p:pic>
+        <p:nvPicPr>
+          <p:cNvPr id="1029" name="Picture 5" descr="D:\FIIT\ING1-ZS\Timovy Projekt\TrollEdit_GitHub\Docs_Repo_SmartGit\Dokumentacie\Ostatne\Poster\Screens_TrollEdit\Main1_hover_big.tif"/>
           <p:cNvPicPr>
             <a:picLocks noChangeAspect="1" noChangeArrowheads="1"/>
           </p:cNvPicPr>
@@ -6934,8 +6960,8 @@
         </p:blipFill>
         <p:spPr bwMode="auto">
           <a:xfrm>
-            <a:off x="9494798" y="10760246"/>
-            <a:ext cx="11260226" cy="7904537"/>
+            <a:off x="16290528" y="14704343"/>
+            <a:ext cx="4104456" cy="3065448"/>
           </a:xfrm>
           <a:prstGeom prst="rect">
             <a:avLst/>
@@ -6943,116 +6969,6 @@
           <a:noFill/>
         </p:spPr>
       </p:pic>
-      <p:pic>
-        <p:nvPicPr>
-          <p:cNvPr id="95" name="Obrázok 94" descr="trollEdit-start_page.png"/>
-          <p:cNvPicPr>
-            <a:picLocks noChangeAspect="1"/>
-          </p:cNvPicPr>
-          <p:nvPr/>
-        </p:nvPicPr>
-        <p:blipFill>
-          <a:blip r:embed="rId26" cstate="print">
-            <a:duotone>
-              <a:schemeClr val="bg2">
-                <a:shade val="45000"/>
-                <a:satMod val="135000"/>
-              </a:schemeClr>
-              <a:prstClr val="white"/>
-            </a:duotone>
-          </a:blip>
-          <a:stretch>
-            <a:fillRect/>
-          </a:stretch>
-        </p:blipFill>
-        <p:spPr>
-          <a:xfrm rot="21393266">
-            <a:off x="6949481" y="18720939"/>
-            <a:ext cx="1890462" cy="722166"/>
-          </a:xfrm>
-          <a:prstGeom prst="rect">
-            <a:avLst/>
-          </a:prstGeom>
-        </p:spPr>
-      </p:pic>
-      <p:pic>
-        <p:nvPicPr>
-          <p:cNvPr id="1028" name="Picture 4" descr="D:\FIIT\ING1-ZS\Timovy Projekt\TrollEdit_GitHub\Docs_Repo_SmartGit\Dokumentacie\Ostatne\Poster\Screens_TrollEdit\Main2_2_big.tif"/>
-          <p:cNvPicPr>
-            <a:picLocks noChangeAspect="1" noChangeArrowheads="1"/>
-          </p:cNvPicPr>
-          <p:nvPr/>
-        </p:nvPicPr>
-        <p:blipFill>
-          <a:blip r:embed="rId27" cstate="print"/>
-          <a:srcRect/>
-          <a:stretch>
-            <a:fillRect/>
-          </a:stretch>
-        </p:blipFill>
-        <p:spPr bwMode="auto">
-          <a:xfrm>
-            <a:off x="9593784" y="11896031"/>
-            <a:ext cx="6580845" cy="5681410"/>
-          </a:xfrm>
-          <a:prstGeom prst="rect">
-            <a:avLst/>
-          </a:prstGeom>
-          <a:noFill/>
-        </p:spPr>
-      </p:pic>
-      <p:pic>
-        <p:nvPicPr>
-          <p:cNvPr id="1029" name="Picture 5" descr="D:\FIIT\ING1-ZS\Timovy Projekt\TrollEdit_GitHub\Docs_Repo_SmartGit\Dokumentacie\Ostatne\Poster\Screens_TrollEdit\Main1_hover_big.tif"/>
-          <p:cNvPicPr>
-            <a:picLocks noChangeAspect="1" noChangeArrowheads="1"/>
-          </p:cNvPicPr>
-          <p:nvPr/>
-        </p:nvPicPr>
-        <p:blipFill>
-          <a:blip r:embed="rId28" cstate="print"/>
-          <a:srcRect/>
-          <a:stretch>
-            <a:fillRect/>
-          </a:stretch>
-        </p:blipFill>
-        <p:spPr bwMode="auto">
-          <a:xfrm>
-            <a:off x="16290528" y="14704343"/>
-            <a:ext cx="4392488" cy="3065448"/>
-          </a:xfrm>
-          <a:prstGeom prst="rect">
-            <a:avLst/>
-          </a:prstGeom>
-          <a:noFill/>
-        </p:spPr>
-      </p:pic>
-      <p:pic>
-        <p:nvPicPr>
-          <p:cNvPr id="1030" name="Picture 6" descr="D:\FIIT\ING1-ZS\Timovy Projekt\TrollEdit_GitHub\Docs_Repo_SmartGit\Dokumentacie\Ostatne\Poster\Img\Techonologies1.tif"/>
-          <p:cNvPicPr>
-            <a:picLocks noChangeAspect="1" noChangeArrowheads="1"/>
-          </p:cNvPicPr>
-          <p:nvPr/>
-        </p:nvPicPr>
-        <p:blipFill>
-          <a:blip r:embed="rId29" cstate="print"/>
-          <a:srcRect/>
-          <a:stretch>
-            <a:fillRect/>
-          </a:stretch>
-        </p:blipFill>
-        <p:spPr bwMode="auto">
-          <a:xfrm>
-            <a:off x="0" y="37974703"/>
-            <a:ext cx="10718800" cy="2946400"/>
-          </a:xfrm>
-          <a:prstGeom prst="rect">
-            <a:avLst/>
-          </a:prstGeom>
-          <a:noFill/>
-        </p:spPr>
-      </p:pic>
       <p:sp>
         <p:nvSpPr>
           <p:cNvPr id="104" name="BlokTextu 103"/>
@@ -7060,8 +6976,8 @@
           <p:nvPr/>
         </p:nvSpPr>
         <p:spPr>
-          <a:xfrm rot="21384659">
-            <a:off x="2868066" y="39781612"/>
+          <a:xfrm>
+            <a:off x="880816" y="37674895"/>
             <a:ext cx="5256584" cy="707886"/>
           </a:xfrm>
           <a:prstGeom prst="rect">
@@ -7085,7 +7001,7 @@
                   </a:outerShdw>
                 </a:effectLst>
               </a:rPr>
-              <a:t>       </a:t>
+              <a:t> </a:t>
             </a:r>
             <a:r>
               <a:rPr lang="sk-SK" sz="3600" b="1" i="1" dirty="0" err="1" smtClean="0">
@@ -7163,8 +7079,8 @@
         </p:nvSpPr>
         <p:spPr>
           <a:xfrm>
-            <a:off x="376760" y="5127279"/>
-            <a:ext cx="9649072" cy="3439239"/>
+            <a:off x="376760" y="5127280"/>
+            <a:ext cx="9828000" cy="4032000"/>
           </a:xfrm>
           <a:prstGeom prst="roundRect">
             <a:avLst/>
@@ -7198,12 +7114,12 @@
           <a:p>
             <a:pPr algn="just"/>
             <a:r>
-              <a:rPr lang="en-US" sz="2400" dirty="0" smtClean="0">
+              <a:rPr lang="en-US" sz="2800" dirty="0" smtClean="0">
                 <a:cs typeface="Arial" pitchFamily="34" charset="0"/>
               </a:rPr>
               <a:t>Today editors usually use simple color highlighting without any sign of graphic enrichment features. However enriching the source code with graphic elements can be beneficial for the understanding of the structure of given code and thus lead to better understanding of its structure and meaning for the programmer.  This basic observation is the driving idea behind TrollEdit.</a:t>
             </a:r>
-            <a:endParaRPr lang="sk-SK" sz="2400" dirty="0" err="1" smtClean="0">
+            <a:endParaRPr lang="sk-SK" sz="2800" dirty="0" err="1" smtClean="0">
               <a:solidFill>
                 <a:schemeClr val="dk1"/>
               </a:solidFill>
@@ -7221,7 +7137,7 @@
         <p:spPr>
           <a:xfrm>
             <a:off x="10385872" y="5127279"/>
-            <a:ext cx="9937104" cy="3439239"/>
+            <a:ext cx="9937104" cy="4032000"/>
           </a:xfrm>
           <a:prstGeom prst="roundRect">
             <a:avLst/>
@@ -7266,18 +7182,18 @@
           <a:p>
             <a:pPr algn="just"/>
             <a:r>
-              <a:rPr lang="en-US" sz="2400" dirty="0" smtClean="0"/>
+              <a:rPr lang="en-US" sz="2800" dirty="0" smtClean="0"/>
               <a:t>The core functionality of TrollEdit is based on the use of </a:t>
             </a:r>
             <a:r>
-              <a:rPr lang="en-US" sz="2400" dirty="0" err="1" smtClean="0"/>
+              <a:rPr lang="en-US" sz="2800" dirty="0" err="1" smtClean="0"/>
               <a:t>LPeg</a:t>
             </a:r>
             <a:r>
-              <a:rPr lang="en-US" sz="2400" dirty="0" smtClean="0"/>
+              <a:rPr lang="en-US" sz="2800" dirty="0" smtClean="0"/>
               <a:t> pattern matching library. Using this library we are able to parse source code according to its grammar into an abstract syntactic tree (AST). This data is then used to enhance the text visualization and so we are able to parse the content on any open file assuming that we have a matching language grammar.</a:t>
             </a:r>
-            <a:endParaRPr lang="sk-SK" sz="2400" dirty="0" err="1" smtClean="0">
+            <a:endParaRPr lang="sk-SK" sz="2800" dirty="0" err="1" smtClean="0">
               <a:solidFill>
                 <a:schemeClr val="dk1"/>
               </a:solidFill>
@@ -7294,7 +7210,7 @@
         <p:spPr>
           <a:xfrm>
             <a:off x="20627728" y="5127280"/>
-            <a:ext cx="9432000" cy="3456000"/>
+            <a:ext cx="9432000" cy="4032000"/>
           </a:xfrm>
           <a:prstGeom prst="roundRect">
             <a:avLst/>
@@ -7336,38 +7252,30 @@
           <a:p>
             <a:pPr algn="just"/>
             <a:r>
-              <a:rPr lang="en-US" sz="2400" dirty="0" err="1" smtClean="0"/>
+              <a:rPr lang="en-US" sz="2800" dirty="0" err="1" smtClean="0"/>
               <a:t>Trolledit</a:t>
             </a:r>
             <a:r>
-              <a:rPr lang="en-US" sz="2400" dirty="0" smtClean="0"/>
+              <a:rPr lang="en-US" sz="2800" dirty="0" smtClean="0"/>
               <a:t> is a </a:t>
             </a:r>
             <a:r>
-              <a:rPr lang="en-US" sz="2400" dirty="0" err="1" smtClean="0"/>
+              <a:rPr lang="en-US" sz="2800" dirty="0" err="1" smtClean="0"/>
               <a:t>dekstop</a:t>
             </a:r>
             <a:r>
-              <a:rPr lang="en-US" sz="2400" dirty="0" smtClean="0"/>
+              <a:rPr lang="en-US" sz="2800" dirty="0" smtClean="0"/>
               <a:t> </a:t>
             </a:r>
             <a:r>
-              <a:rPr lang="en-US" sz="2400" dirty="0" err="1" smtClean="0"/>
+              <a:rPr lang="en-US" sz="2800" dirty="0" err="1" smtClean="0"/>
               <a:t>applicaton</a:t>
             </a:r>
             <a:r>
-              <a:rPr lang="en-US" sz="2400" dirty="0" smtClean="0"/>
+              <a:rPr lang="en-US" sz="2800" dirty="0" smtClean="0"/>
               <a:t> based on multiplatform framework Qt. Basically TrollEdit is an enhanced text editor developed as a real market product. It's strongest feature is based on graphical text enrichment based on semantically analyzed file content.</a:t>
             </a:r>
-            <a:endParaRPr lang="sk-SK" sz="2400" dirty="0" smtClean="0"/>
-          </a:p>
-          <a:p>
-            <a:pPr algn="just"/>
-            <a:endParaRPr lang="sk-SK" sz="2400" dirty="0" smtClean="0">
-              <a:solidFill>
-                <a:schemeClr val="dk1"/>
-              </a:solidFill>
-            </a:endParaRPr>
+            <a:endParaRPr lang="sk-SK" sz="2800" dirty="0" smtClean="0"/>
           </a:p>
           <a:p>
             <a:pPr algn="just"/>
@@ -7387,6 +7295,198 @@
           </a:p>
         </p:txBody>
       </p:sp>
+      <p:grpSp>
+        <p:nvGrpSpPr>
+          <p:cNvPr id="70" name="Skupina 69"/>
+          <p:cNvGrpSpPr/>
+          <p:nvPr/>
+        </p:nvGrpSpPr>
+        <p:grpSpPr>
+          <a:xfrm>
+            <a:off x="592784" y="38250959"/>
+            <a:ext cx="10729192" cy="2209022"/>
+            <a:chOff x="448768" y="37731745"/>
+            <a:chExt cx="9833477" cy="1848982"/>
+          </a:xfrm>
+        </p:grpSpPr>
+        <p:pic>
+          <p:nvPicPr>
+            <p:cNvPr id="71" name="Obrázok 70" descr="GitHub_Logo.png"/>
+            <p:cNvPicPr>
+              <a:picLocks noChangeAspect="1"/>
+            </p:cNvPicPr>
+            <p:nvPr/>
+          </p:nvPicPr>
+          <p:blipFill>
+            <a:blip r:embed="rId26" cstate="print">
+              <a:grayscl/>
+              <a:lum contrast="-40000"/>
+            </a:blip>
+            <a:stretch>
+              <a:fillRect/>
+            </a:stretch>
+          </p:blipFill>
+          <p:spPr>
+            <a:xfrm>
+              <a:off x="4985272" y="38466983"/>
+              <a:ext cx="1872208" cy="831615"/>
+            </a:xfrm>
+            <a:prstGeom prst="rect">
+              <a:avLst/>
+            </a:prstGeom>
+          </p:spPr>
+        </p:pic>
+        <p:pic>
+          <p:nvPicPr>
+            <p:cNvPr id="72" name="Obrázok 71" descr="cmake75.png"/>
+            <p:cNvPicPr>
+              <a:picLocks noChangeAspect="1"/>
+            </p:cNvPicPr>
+            <p:nvPr/>
+          </p:nvPicPr>
+          <p:blipFill>
+            <a:blip r:embed="rId27" cstate="print">
+              <a:grayscl/>
+            </a:blip>
+            <a:stretch>
+              <a:fillRect/>
+            </a:stretch>
+          </p:blipFill>
+          <p:spPr>
+            <a:xfrm>
+              <a:off x="7577560" y="38250959"/>
+              <a:ext cx="2704685" cy="1080120"/>
+            </a:xfrm>
+            <a:prstGeom prst="rect">
+              <a:avLst/>
+            </a:prstGeom>
+          </p:spPr>
+        </p:pic>
+        <p:pic>
+          <p:nvPicPr>
+            <p:cNvPr id="75" name="Picture 2" descr="C:\Users\Jozef89\Desktop\Nejaka_grafika\Nejaka_grafika\lua.png"/>
+            <p:cNvPicPr>
+              <a:picLocks noChangeAspect="1" noChangeArrowheads="1"/>
+            </p:cNvPicPr>
+            <p:nvPr/>
+          </p:nvPicPr>
+          <p:blipFill>
+            <a:blip r:embed="rId28" cstate="print"/>
+            <a:srcRect/>
+            <a:stretch>
+              <a:fillRect/>
+            </a:stretch>
+          </p:blipFill>
+          <p:spPr bwMode="auto">
+            <a:xfrm>
+              <a:off x="2681016" y="37894022"/>
+              <a:ext cx="1615891" cy="1581073"/>
+            </a:xfrm>
+            <a:prstGeom prst="rect">
+              <a:avLst/>
+            </a:prstGeom>
+            <a:noFill/>
+          </p:spPr>
+        </p:pic>
+        <p:pic>
+          <p:nvPicPr>
+            <p:cNvPr id="87" name="Picture 3" descr="C:\Users\Jozef89\Desktop\Nejaka_grafika\Nejaka_grafika\qt.png"/>
+            <p:cNvPicPr>
+              <a:picLocks noChangeAspect="1" noChangeArrowheads="1"/>
+            </p:cNvPicPr>
+            <p:nvPr/>
+          </p:nvPicPr>
+          <p:blipFill>
+            <a:blip r:embed="rId29" cstate="print"/>
+            <a:srcRect/>
+            <a:stretch>
+              <a:fillRect/>
+            </a:stretch>
+          </p:blipFill>
+          <p:spPr bwMode="auto">
+            <a:xfrm>
+              <a:off x="448768" y="37731745"/>
+              <a:ext cx="1672904" cy="1848982"/>
+            </a:xfrm>
+            <a:prstGeom prst="rect">
+              <a:avLst/>
+            </a:prstGeom>
+            <a:noFill/>
+          </p:spPr>
+        </p:pic>
+      </p:grpSp>
+      <p:pic>
+        <p:nvPicPr>
+          <p:cNvPr id="88" name="Obrázok 87" descr="ff.png"/>
+          <p:cNvPicPr>
+            <a:picLocks noChangeAspect="1"/>
+          </p:cNvPicPr>
+          <p:nvPr/>
+        </p:nvPicPr>
+        <p:blipFill>
+          <a:blip r:embed="rId30" cstate="print"/>
+          <a:stretch>
+            <a:fillRect/>
+          </a:stretch>
+        </p:blipFill>
+        <p:spPr>
+          <a:xfrm>
+            <a:off x="664793" y="25217511"/>
+            <a:ext cx="3960440" cy="4420577"/>
+          </a:xfrm>
+          <a:prstGeom prst="rect">
+            <a:avLst/>
+          </a:prstGeom>
+        </p:spPr>
+      </p:pic>
+      <p:pic>
+        <p:nvPicPr>
+          <p:cNvPr id="92" name="Obrázok 91" descr="ss.png"/>
+          <p:cNvPicPr>
+            <a:picLocks noChangeAspect="1"/>
+          </p:cNvPicPr>
+          <p:nvPr/>
+        </p:nvPicPr>
+        <p:blipFill>
+          <a:blip r:embed="rId31" cstate="print"/>
+          <a:stretch>
+            <a:fillRect/>
+          </a:stretch>
+        </p:blipFill>
+        <p:spPr>
+          <a:xfrm>
+            <a:off x="24499440" y="27737791"/>
+            <a:ext cx="1469875" cy="288032"/>
+          </a:xfrm>
+          <a:prstGeom prst="rect">
+            <a:avLst/>
+          </a:prstGeom>
+        </p:spPr>
+      </p:pic>
+      <p:pic>
+        <p:nvPicPr>
+          <p:cNvPr id="93" name="Obrázok 92" descr="trollEdit-start_page.png"/>
+          <p:cNvPicPr>
+            <a:picLocks noChangeAspect="1"/>
+          </p:cNvPicPr>
+          <p:nvPr/>
+        </p:nvPicPr>
+        <p:blipFill>
+          <a:blip r:embed="rId32" cstate="print"/>
+          <a:stretch>
+            <a:fillRect/>
+          </a:stretch>
+        </p:blipFill>
+        <p:spPr>
+          <a:xfrm>
+            <a:off x="4697240" y="27161727"/>
+            <a:ext cx="1082865" cy="1080120"/>
+          </a:xfrm>
+          <a:prstGeom prst="rect">
+            <a:avLst/>
+          </a:prstGeom>
+        </p:spPr>
+      </p:pic>
     </p:spTree>
   </p:cSld>
   <p:clrMapOvr>

</xml_diff>

<commit_message>
[!] Pre Drahosa na posledne pozretie
</commit_message>
<xml_diff>
--- a/Dokumentacie/Ostatne/Poster/poster2.pptx
+++ b/Dokumentacie/Ostatne/Poster/poster2.pptx
@@ -3617,13 +3617,18 @@
           <a:p>
             <a:pPr algn="r"/>
             <a:r>
-              <a:rPr lang="fr-FR" sz="2800" dirty="0" smtClean="0">
+              <a:rPr lang="fr-FR" sz="2800" smtClean="0">
                 <a:solidFill>
                   <a:schemeClr val="bg1"/>
                 </a:solidFill>
               </a:rPr>
               <a:t>http://innovators-team10.github.com</a:t>
             </a:r>
+            <a:endParaRPr lang="fr-FR" sz="2800" dirty="0" smtClean="0">
+              <a:solidFill>
+                <a:schemeClr val="bg1"/>
+              </a:solidFill>
+            </a:endParaRPr>
           </a:p>
           <a:p>
             <a:pPr algn="r"/>

</xml_diff>

<commit_message>
[!] Poster - final
</commit_message>
<xml_diff>
--- a/Dokumentacie/Ostatne/Poster/poster2.pptx
+++ b/Dokumentacie/Ostatne/Poster/poster2.pptx
@@ -289,7 +289,7 @@
             <a:fld id="{1D8D854A-19DA-40F4-B9B0-2B2EB915EC68}" type="datetimeFigureOut">
               <a:rPr lang="sk-SK" smtClean="0"/>
               <a:pPr/>
-              <a:t>23. 4. 2012</a:t>
+              <a:t>24. 4. 2012</a:t>
             </a:fld>
             <a:endParaRPr lang="sk-SK"/>
           </a:p>
@@ -456,7 +456,7 @@
             <a:fld id="{1D8D854A-19DA-40F4-B9B0-2B2EB915EC68}" type="datetimeFigureOut">
               <a:rPr lang="sk-SK" smtClean="0"/>
               <a:pPr/>
-              <a:t>23. 4. 2012</a:t>
+              <a:t>24. 4. 2012</a:t>
             </a:fld>
             <a:endParaRPr lang="sk-SK"/>
           </a:p>
@@ -633,7 +633,7 @@
             <a:fld id="{1D8D854A-19DA-40F4-B9B0-2B2EB915EC68}" type="datetimeFigureOut">
               <a:rPr lang="sk-SK" smtClean="0"/>
               <a:pPr/>
-              <a:t>23. 4. 2012</a:t>
+              <a:t>24. 4. 2012</a:t>
             </a:fld>
             <a:endParaRPr lang="sk-SK"/>
           </a:p>
@@ -800,7 +800,7 @@
             <a:fld id="{1D8D854A-19DA-40F4-B9B0-2B2EB915EC68}" type="datetimeFigureOut">
               <a:rPr lang="sk-SK" smtClean="0"/>
               <a:pPr/>
-              <a:t>23. 4. 2012</a:t>
+              <a:t>24. 4. 2012</a:t>
             </a:fld>
             <a:endParaRPr lang="sk-SK"/>
           </a:p>
@@ -1043,7 +1043,7 @@
             <a:fld id="{1D8D854A-19DA-40F4-B9B0-2B2EB915EC68}" type="datetimeFigureOut">
               <a:rPr lang="sk-SK" smtClean="0"/>
               <a:pPr/>
-              <a:t>23. 4. 2012</a:t>
+              <a:t>24. 4. 2012</a:t>
             </a:fld>
             <a:endParaRPr lang="sk-SK"/>
           </a:p>
@@ -1328,7 +1328,7 @@
             <a:fld id="{1D8D854A-19DA-40F4-B9B0-2B2EB915EC68}" type="datetimeFigureOut">
               <a:rPr lang="sk-SK" smtClean="0"/>
               <a:pPr/>
-              <a:t>23. 4. 2012</a:t>
+              <a:t>24. 4. 2012</a:t>
             </a:fld>
             <a:endParaRPr lang="sk-SK"/>
           </a:p>
@@ -1752,7 +1752,7 @@
             <a:fld id="{1D8D854A-19DA-40F4-B9B0-2B2EB915EC68}" type="datetimeFigureOut">
               <a:rPr lang="sk-SK" smtClean="0"/>
               <a:pPr/>
-              <a:t>23. 4. 2012</a:t>
+              <a:t>24. 4. 2012</a:t>
             </a:fld>
             <a:endParaRPr lang="sk-SK"/>
           </a:p>
@@ -1867,7 +1867,7 @@
             <a:fld id="{1D8D854A-19DA-40F4-B9B0-2B2EB915EC68}" type="datetimeFigureOut">
               <a:rPr lang="sk-SK" smtClean="0"/>
               <a:pPr/>
-              <a:t>23. 4. 2012</a:t>
+              <a:t>24. 4. 2012</a:t>
             </a:fld>
             <a:endParaRPr lang="sk-SK"/>
           </a:p>
@@ -1959,7 +1959,7 @@
             <a:fld id="{1D8D854A-19DA-40F4-B9B0-2B2EB915EC68}" type="datetimeFigureOut">
               <a:rPr lang="sk-SK" smtClean="0"/>
               <a:pPr/>
-              <a:t>23. 4. 2012</a:t>
+              <a:t>24. 4. 2012</a:t>
             </a:fld>
             <a:endParaRPr lang="sk-SK"/>
           </a:p>
@@ -2233,7 +2233,7 @@
             <a:fld id="{1D8D854A-19DA-40F4-B9B0-2B2EB915EC68}" type="datetimeFigureOut">
               <a:rPr lang="sk-SK" smtClean="0"/>
               <a:pPr/>
-              <a:t>23. 4. 2012</a:t>
+              <a:t>24. 4. 2012</a:t>
             </a:fld>
             <a:endParaRPr lang="sk-SK"/>
           </a:p>
@@ -2483,7 +2483,7 @@
             <a:fld id="{1D8D854A-19DA-40F4-B9B0-2B2EB915EC68}" type="datetimeFigureOut">
               <a:rPr lang="sk-SK" smtClean="0"/>
               <a:pPr/>
-              <a:t>23. 4. 2012</a:t>
+              <a:t>24. 4. 2012</a:t>
             </a:fld>
             <a:endParaRPr lang="sk-SK"/>
           </a:p>
@@ -2693,7 +2693,7 @@
             <a:fld id="{1D8D854A-19DA-40F4-B9B0-2B2EB915EC68}" type="datetimeFigureOut">
               <a:rPr lang="sk-SK" smtClean="0"/>
               <a:pPr/>
-              <a:t>23. 4. 2012</a:t>
+              <a:t>24. 4. 2012</a:t>
             </a:fld>
             <a:endParaRPr lang="sk-SK"/>
           </a:p>
@@ -7184,7 +7184,19 @@
               </a:r>
               <a:r>
                 <a:rPr lang="en-US" sz="2800" dirty="0" smtClean="0"/>
-                <a:t>based on multiplatform framework Qt. Basically TrollEdit is an enhanced text editor developed as a real market product. It's strongest feature is based on graphical text enrichment based on semantically analyzed file content.</a:t>
+                <a:t>based on </a:t>
+              </a:r>
+              <a:r>
+                <a:rPr lang="en-US" sz="2800" smtClean="0"/>
+                <a:t>multiplatform </a:t>
+              </a:r>
+              <a:r>
+                <a:rPr lang="en-US" sz="2800" smtClean="0"/>
+                <a:t>Qt framework. </a:t>
+              </a:r>
+              <a:r>
+                <a:rPr lang="en-US" sz="2800" dirty="0" smtClean="0"/>
+                <a:t>Basically TrollEdit is an enhanced text editor developed as a real market product. It's strongest feature is based on graphical text enrichment based on semantically analyzed file content.</a:t>
               </a:r>
               <a:endParaRPr lang="sk-SK" sz="2800" dirty="0" smtClean="0"/>
             </a:p>

</xml_diff>